<commit_message>
Reduce power consumption modifying board to turn off sensors in deep-sleep Added temperature sensor module to correct for load-cell temperature drift Added image of non-mirrored front of original board
</commit_message>
<xml_diff>
--- a/Modification Pics/wiring.pptx
+++ b/Modification Pics/wiring.pptx
@@ -7,6 +7,8 @@
   <p:sldIdLst>
     <p:sldId id="256" r:id="rId2"/>
     <p:sldId id="257" r:id="rId3"/>
+    <p:sldId id="258" r:id="rId4"/>
+    <p:sldId id="259" r:id="rId5"/>
   </p:sldIdLst>
   <p:sldSz cx="9144000" cy="6858000" type="screen4x3"/>
   <p:notesSz cx="6858000" cy="9144000"/>
@@ -289,7 +291,7 @@
           <a:p>
             <a:fld id="{85F571AB-A0F2-4071-89A4-13386C67F12A}" type="datetimeFigureOut">
               <a:rPr lang="en-US" smtClean="0"/>
-              <a:t>11/27/2022</a:t>
+              <a:t>12/3/2022</a:t>
             </a:fld>
             <a:endParaRPr lang="en-US"/>
           </a:p>
@@ -459,7 +461,7 @@
           <a:p>
             <a:fld id="{85F571AB-A0F2-4071-89A4-13386C67F12A}" type="datetimeFigureOut">
               <a:rPr lang="en-US" smtClean="0"/>
-              <a:t>11/27/2022</a:t>
+              <a:t>12/3/2022</a:t>
             </a:fld>
             <a:endParaRPr lang="en-US"/>
           </a:p>
@@ -639,7 +641,7 @@
           <a:p>
             <a:fld id="{85F571AB-A0F2-4071-89A4-13386C67F12A}" type="datetimeFigureOut">
               <a:rPr lang="en-US" smtClean="0"/>
-              <a:t>11/27/2022</a:t>
+              <a:t>12/3/2022</a:t>
             </a:fld>
             <a:endParaRPr lang="en-US"/>
           </a:p>
@@ -809,7 +811,7 @@
           <a:p>
             <a:fld id="{85F571AB-A0F2-4071-89A4-13386C67F12A}" type="datetimeFigureOut">
               <a:rPr lang="en-US" smtClean="0"/>
-              <a:t>11/27/2022</a:t>
+              <a:t>12/3/2022</a:t>
             </a:fld>
             <a:endParaRPr lang="en-US"/>
           </a:p>
@@ -1055,7 +1057,7 @@
           <a:p>
             <a:fld id="{85F571AB-A0F2-4071-89A4-13386C67F12A}" type="datetimeFigureOut">
               <a:rPr lang="en-US" smtClean="0"/>
-              <a:t>11/27/2022</a:t>
+              <a:t>12/3/2022</a:t>
             </a:fld>
             <a:endParaRPr lang="en-US"/>
           </a:p>
@@ -1343,7 +1345,7 @@
           <a:p>
             <a:fld id="{85F571AB-A0F2-4071-89A4-13386C67F12A}" type="datetimeFigureOut">
               <a:rPr lang="en-US" smtClean="0"/>
-              <a:t>11/27/2022</a:t>
+              <a:t>12/3/2022</a:t>
             </a:fld>
             <a:endParaRPr lang="en-US"/>
           </a:p>
@@ -1765,7 +1767,7 @@
           <a:p>
             <a:fld id="{85F571AB-A0F2-4071-89A4-13386C67F12A}" type="datetimeFigureOut">
               <a:rPr lang="en-US" smtClean="0"/>
-              <a:t>11/27/2022</a:t>
+              <a:t>12/3/2022</a:t>
             </a:fld>
             <a:endParaRPr lang="en-US"/>
           </a:p>
@@ -1883,7 +1885,7 @@
           <a:p>
             <a:fld id="{85F571AB-A0F2-4071-89A4-13386C67F12A}" type="datetimeFigureOut">
               <a:rPr lang="en-US" smtClean="0"/>
-              <a:t>11/27/2022</a:t>
+              <a:t>12/3/2022</a:t>
             </a:fld>
             <a:endParaRPr lang="en-US"/>
           </a:p>
@@ -1978,7 +1980,7 @@
           <a:p>
             <a:fld id="{85F571AB-A0F2-4071-89A4-13386C67F12A}" type="datetimeFigureOut">
               <a:rPr lang="en-US" smtClean="0"/>
-              <a:t>11/27/2022</a:t>
+              <a:t>12/3/2022</a:t>
             </a:fld>
             <a:endParaRPr lang="en-US"/>
           </a:p>
@@ -2255,7 +2257,7 @@
           <a:p>
             <a:fld id="{85F571AB-A0F2-4071-89A4-13386C67F12A}" type="datetimeFigureOut">
               <a:rPr lang="en-US" smtClean="0"/>
-              <a:t>11/27/2022</a:t>
+              <a:t>12/3/2022</a:t>
             </a:fld>
             <a:endParaRPr lang="en-US"/>
           </a:p>
@@ -2508,7 +2510,7 @@
           <a:p>
             <a:fld id="{85F571AB-A0F2-4071-89A4-13386C67F12A}" type="datetimeFigureOut">
               <a:rPr lang="en-US" smtClean="0"/>
-              <a:t>11/27/2022</a:t>
+              <a:t>12/3/2022</a:t>
             </a:fld>
             <a:endParaRPr lang="en-US"/>
           </a:p>
@@ -2721,7 +2723,7 @@
           <a:p>
             <a:fld id="{85F571AB-A0F2-4071-89A4-13386C67F12A}" type="datetimeFigureOut">
               <a:rPr lang="en-US" smtClean="0"/>
-              <a:t>11/27/2022</a:t>
+              <a:t>12/3/2022</a:t>
             </a:fld>
             <a:endParaRPr lang="en-US"/>
           </a:p>
@@ -4334,6 +4336,13 @@
   <p:clrMapOvr>
     <a:masterClrMapping/>
   </p:clrMapOvr>
+  <p:timing>
+    <p:tnLst>
+      <p:par>
+        <p:cTn id="1" dur="indefinite" restart="never" nodeType="tmRoot"/>
+      </p:par>
+    </p:tnLst>
+  </p:timing>
 </p:sld>
 </file>
 
@@ -4356,20 +4365,2905 @@
       </p:grpSpPr>
       <p:pic>
         <p:nvPicPr>
-          <p:cNvPr id="2053" name="Picture 5" descr="Y:\Documents\My Files\Electrical &amp; Electronics\ESPHome-Mod-Flame-King-Propane-Scale\Board Pics\back_scaled-nochip-composite.jpg"/>
+          <p:cNvPr id="2050" name="Picture 2"/>
           <p:cNvPicPr>
             <a:picLocks noChangeAspect="1" noChangeArrowheads="1"/>
           </p:cNvPicPr>
           <p:nvPr/>
         </p:nvPicPr>
+        <p:blipFill>
+          <a:blip r:embed="rId2" cstate="print">
+            <a:extLst>
+              <a:ext uri="{28A0092B-C50C-407E-A947-70E740481C1C}">
+                <a14:useLocalDpi xmlns:a14="http://schemas.microsoft.com/office/drawing/2010/main" val="0"/>
+              </a:ext>
+            </a:extLst>
+          </a:blip>
+          <a:srcRect/>
+          <a:stretch>
+            <a:fillRect/>
+          </a:stretch>
+        </p:blipFill>
+        <p:spPr bwMode="auto">
+          <a:xfrm>
+            <a:off x="0" y="836312"/>
+            <a:ext cx="9144000" cy="4528062"/>
+          </a:xfrm>
+          <a:prstGeom prst="rect">
+            <a:avLst/>
+          </a:prstGeom>
+          <a:noFill/>
+          <a:ln>
+            <a:noFill/>
+          </a:ln>
+          <a:effectLst/>
+          <a:extLst>
+            <a:ext uri="{909E8E84-426E-40DD-AFC4-6F175D3DCCD1}">
+              <a14:hiddenFill xmlns:a14="http://schemas.microsoft.com/office/drawing/2010/main">
+                <a:solidFill>
+                  <a:schemeClr val="accent1"/>
+                </a:solidFill>
+              </a14:hiddenFill>
+            </a:ext>
+            <a:ext uri="{91240B29-F687-4F45-9708-019B960494DF}">
+              <a14:hiddenLine xmlns:a14="http://schemas.microsoft.com/office/drawing/2010/main" w="9525">
+                <a:solidFill>
+                  <a:schemeClr val="tx1"/>
+                </a:solidFill>
+                <a:miter lim="800000"/>
+                <a:headEnd/>
+                <a:tailEnd/>
+              </a14:hiddenLine>
+            </a:ext>
+            <a:ext uri="{AF507438-7753-43E0-B8FC-AC1667EBCBE1}">
+              <a14:hiddenEffects xmlns:a14="http://schemas.microsoft.com/office/drawing/2010/main">
+                <a:effectLst>
+                  <a:outerShdw dist="35921" dir="2700000" algn="ctr" rotWithShape="0">
+                    <a:schemeClr val="bg2"/>
+                  </a:outerShdw>
+                </a:effectLst>
+              </a14:hiddenEffects>
+            </a:ext>
+          </a:extLst>
+        </p:spPr>
+      </p:pic>
+      <p:cxnSp>
+        <p:nvCxnSpPr>
+          <p:cNvPr id="8" name="Straight Arrow Connector 7"/>
+          <p:cNvCxnSpPr/>
+          <p:nvPr/>
+        </p:nvCxnSpPr>
+        <p:spPr>
+          <a:xfrm flipV="1">
+            <a:off x="2286000" y="4375150"/>
+            <a:ext cx="514350" cy="1265019"/>
+          </a:xfrm>
+          <a:prstGeom prst="straightConnector1">
+            <a:avLst/>
+          </a:prstGeom>
+          <a:ln w="63500">
+            <a:solidFill>
+              <a:schemeClr val="bg1"/>
+            </a:solidFill>
+            <a:tailEnd type="arrow" w="sm" len="sm"/>
+          </a:ln>
+        </p:spPr>
+        <p:style>
+          <a:lnRef idx="1">
+            <a:schemeClr val="accent1"/>
+          </a:lnRef>
+          <a:fillRef idx="0">
+            <a:schemeClr val="accent1"/>
+          </a:fillRef>
+          <a:effectRef idx="0">
+            <a:schemeClr val="accent1"/>
+          </a:effectRef>
+          <a:fontRef idx="minor">
+            <a:schemeClr val="tx1"/>
+          </a:fontRef>
+        </p:style>
+      </p:cxnSp>
+      <p:cxnSp>
+        <p:nvCxnSpPr>
+          <p:cNvPr id="16" name="Straight Arrow Connector 15"/>
+          <p:cNvCxnSpPr/>
+          <p:nvPr/>
+        </p:nvCxnSpPr>
+        <p:spPr>
+          <a:xfrm flipH="1" flipV="1">
+            <a:off x="2800350" y="3705226"/>
+            <a:ext cx="514350" cy="2009774"/>
+          </a:xfrm>
+          <a:prstGeom prst="straightConnector1">
+            <a:avLst/>
+          </a:prstGeom>
+          <a:ln w="38100">
+            <a:solidFill>
+              <a:schemeClr val="tx1"/>
+            </a:solidFill>
+            <a:tailEnd type="arrow"/>
+          </a:ln>
+        </p:spPr>
+        <p:style>
+          <a:lnRef idx="1">
+            <a:schemeClr val="accent1"/>
+          </a:lnRef>
+          <a:fillRef idx="0">
+            <a:schemeClr val="accent1"/>
+          </a:fillRef>
+          <a:effectRef idx="0">
+            <a:schemeClr val="accent1"/>
+          </a:effectRef>
+          <a:fontRef idx="minor">
+            <a:schemeClr val="tx1"/>
+          </a:fontRef>
+        </p:style>
+      </p:cxnSp>
+      <p:cxnSp>
+        <p:nvCxnSpPr>
+          <p:cNvPr id="19" name="Straight Arrow Connector 18"/>
+          <p:cNvCxnSpPr/>
+          <p:nvPr/>
+        </p:nvCxnSpPr>
+        <p:spPr>
+          <a:xfrm>
+            <a:off x="2286000" y="1626632"/>
+            <a:ext cx="1128713" cy="1295162"/>
+          </a:xfrm>
+          <a:prstGeom prst="straightConnector1">
+            <a:avLst/>
+          </a:prstGeom>
+          <a:ln w="63500">
+            <a:solidFill>
+              <a:schemeClr val="tx1"/>
+            </a:solidFill>
+            <a:tailEnd type="arrow" w="sm" len="sm"/>
+          </a:ln>
+        </p:spPr>
+        <p:style>
+          <a:lnRef idx="1">
+            <a:schemeClr val="accent1"/>
+          </a:lnRef>
+          <a:fillRef idx="0">
+            <a:schemeClr val="accent1"/>
+          </a:fillRef>
+          <a:effectRef idx="0">
+            <a:schemeClr val="accent1"/>
+          </a:effectRef>
+          <a:fontRef idx="minor">
+            <a:schemeClr val="tx1"/>
+          </a:fontRef>
+        </p:style>
+      </p:cxnSp>
+      <p:sp>
+        <p:nvSpPr>
+          <p:cNvPr id="15" name="TextBox 14"/>
+          <p:cNvSpPr txBox="1"/>
+          <p:nvPr/>
+        </p:nvSpPr>
+        <p:spPr>
+          <a:xfrm>
+            <a:off x="1591383" y="1028700"/>
+            <a:ext cx="1503938" cy="646331"/>
+          </a:xfrm>
+          <a:prstGeom prst="rect">
+            <a:avLst/>
+          </a:prstGeom>
+          <a:noFill/>
+        </p:spPr>
+        <p:txBody>
+          <a:bodyPr wrap="none" rtlCol="0">
+            <a:spAutoFit/>
+          </a:bodyPr>
+          <a:lstStyle/>
+          <a:p>
+            <a:pPr algn="ctr"/>
+            <a:r>
+              <a:rPr lang="en-US" b="1" dirty="0" smtClean="0"/>
+              <a:t>Status</a:t>
+            </a:r>
+          </a:p>
+          <a:p>
+            <a:pPr algn="ctr"/>
+            <a:r>
+              <a:rPr lang="en-US" b="1" dirty="0" smtClean="0"/>
+              <a:t>LED (3.3v=on)</a:t>
+            </a:r>
+            <a:endParaRPr lang="en-US" b="1" dirty="0"/>
+          </a:p>
+        </p:txBody>
+      </p:sp>
+      <p:sp>
+        <p:nvSpPr>
+          <p:cNvPr id="20" name="Oval 19"/>
+          <p:cNvSpPr/>
+          <p:nvPr/>
+        </p:nvSpPr>
+        <p:spPr>
+          <a:xfrm>
+            <a:off x="3417085" y="2855124"/>
+            <a:ext cx="114704" cy="114704"/>
+          </a:xfrm>
+          <a:prstGeom prst="ellipse">
+            <a:avLst/>
+          </a:prstGeom>
+          <a:noFill/>
+          <a:ln>
+            <a:solidFill>
+              <a:srgbClr val="FFFF00"/>
+            </a:solidFill>
+          </a:ln>
+        </p:spPr>
+        <p:style>
+          <a:lnRef idx="2">
+            <a:schemeClr val="accent1">
+              <a:shade val="50000"/>
+            </a:schemeClr>
+          </a:lnRef>
+          <a:fillRef idx="1">
+            <a:schemeClr val="accent1"/>
+          </a:fillRef>
+          <a:effectRef idx="0">
+            <a:schemeClr val="accent1"/>
+          </a:effectRef>
+          <a:fontRef idx="minor">
+            <a:schemeClr val="lt1"/>
+          </a:fontRef>
+        </p:style>
+        <p:txBody>
+          <a:bodyPr rtlCol="0" anchor="ctr"/>
+          <a:lstStyle/>
+          <a:p>
+            <a:pPr algn="ctr"/>
+            <a:endParaRPr lang="en-US"/>
+          </a:p>
+        </p:txBody>
+      </p:sp>
+      <p:sp>
+        <p:nvSpPr>
+          <p:cNvPr id="25" name="Oval 24"/>
+          <p:cNvSpPr/>
+          <p:nvPr/>
+        </p:nvSpPr>
+        <p:spPr>
+          <a:xfrm>
+            <a:off x="1600200" y="4976414"/>
+            <a:ext cx="114704" cy="114704"/>
+          </a:xfrm>
+          <a:prstGeom prst="ellipse">
+            <a:avLst/>
+          </a:prstGeom>
+          <a:noFill/>
+          <a:ln>
+            <a:solidFill>
+              <a:schemeClr val="bg1">
+                <a:lumMod val="85000"/>
+              </a:schemeClr>
+            </a:solidFill>
+          </a:ln>
+        </p:spPr>
+        <p:style>
+          <a:lnRef idx="2">
+            <a:schemeClr val="accent1">
+              <a:shade val="50000"/>
+            </a:schemeClr>
+          </a:lnRef>
+          <a:fillRef idx="1">
+            <a:schemeClr val="accent1"/>
+          </a:fillRef>
+          <a:effectRef idx="0">
+            <a:schemeClr val="accent1"/>
+          </a:effectRef>
+          <a:fontRef idx="minor">
+            <a:schemeClr val="lt1"/>
+          </a:fontRef>
+        </p:style>
+        <p:txBody>
+          <a:bodyPr rtlCol="0" anchor="ctr"/>
+          <a:lstStyle/>
+          <a:p>
+            <a:pPr algn="ctr"/>
+            <a:endParaRPr lang="en-US"/>
+          </a:p>
+        </p:txBody>
+      </p:sp>
+      <p:cxnSp>
+        <p:nvCxnSpPr>
+          <p:cNvPr id="26" name="Straight Arrow Connector 25"/>
+          <p:cNvCxnSpPr/>
+          <p:nvPr/>
+        </p:nvCxnSpPr>
+        <p:spPr>
+          <a:xfrm flipV="1">
+            <a:off x="1257300" y="5091118"/>
+            <a:ext cx="390727" cy="623882"/>
+          </a:xfrm>
+          <a:prstGeom prst="straightConnector1">
+            <a:avLst/>
+          </a:prstGeom>
+          <a:ln w="38100">
+            <a:solidFill>
+              <a:schemeClr val="bg1">
+                <a:lumMod val="85000"/>
+              </a:schemeClr>
+            </a:solidFill>
+            <a:tailEnd type="arrow"/>
+          </a:ln>
+        </p:spPr>
+        <p:style>
+          <a:lnRef idx="1">
+            <a:schemeClr val="accent1"/>
+          </a:lnRef>
+          <a:fillRef idx="0">
+            <a:schemeClr val="accent1"/>
+          </a:fillRef>
+          <a:effectRef idx="0">
+            <a:schemeClr val="accent1"/>
+          </a:effectRef>
+          <a:fontRef idx="minor">
+            <a:schemeClr val="tx1"/>
+          </a:fontRef>
+        </p:style>
+      </p:cxnSp>
+      <p:sp>
+        <p:nvSpPr>
+          <p:cNvPr id="28" name="TextBox 27"/>
+          <p:cNvSpPr txBox="1"/>
+          <p:nvPr/>
+        </p:nvSpPr>
+        <p:spPr>
+          <a:xfrm>
+            <a:off x="623228" y="5600700"/>
+            <a:ext cx="952248" cy="923330"/>
+          </a:xfrm>
+          <a:prstGeom prst="rect">
+            <a:avLst/>
+          </a:prstGeom>
+          <a:noFill/>
+        </p:spPr>
+        <p:txBody>
+          <a:bodyPr wrap="none" rtlCol="0">
+            <a:spAutoFit/>
+          </a:bodyPr>
+          <a:lstStyle/>
+          <a:p>
+            <a:pPr algn="ctr"/>
+            <a:r>
+              <a:rPr lang="en-US" b="1" dirty="0" smtClean="0"/>
+              <a:t>Analog</a:t>
+            </a:r>
+          </a:p>
+          <a:p>
+            <a:pPr algn="ctr"/>
+            <a:r>
+              <a:rPr lang="en-US" b="1" dirty="0" smtClean="0"/>
+              <a:t>Weight</a:t>
+            </a:r>
+          </a:p>
+          <a:p>
+            <a:pPr algn="ctr"/>
+            <a:r>
+              <a:rPr lang="en-US" b="1" dirty="0" smtClean="0"/>
+              <a:t>Reading</a:t>
+            </a:r>
+            <a:endParaRPr lang="en-US" b="1" dirty="0"/>
+          </a:p>
+        </p:txBody>
+      </p:sp>
+      <p:sp>
+        <p:nvSpPr>
+          <p:cNvPr id="29" name="TextBox 28"/>
+          <p:cNvSpPr txBox="1"/>
+          <p:nvPr/>
+        </p:nvSpPr>
+        <p:spPr>
+          <a:xfrm>
+            <a:off x="1637721" y="5591770"/>
+            <a:ext cx="1528047" cy="1200329"/>
+          </a:xfrm>
+          <a:prstGeom prst="rect">
+            <a:avLst/>
+          </a:prstGeom>
+          <a:noFill/>
+        </p:spPr>
+        <p:txBody>
+          <a:bodyPr wrap="none" rtlCol="0">
+            <a:spAutoFit/>
+          </a:bodyPr>
+          <a:lstStyle/>
+          <a:p>
+            <a:pPr algn="ctr"/>
+            <a:r>
+              <a:rPr lang="en-US" b="1" dirty="0" smtClean="0">
+                <a:solidFill>
+                  <a:srgbClr val="008000"/>
+                </a:solidFill>
+              </a:rPr>
+              <a:t>3.3v</a:t>
+            </a:r>
+          </a:p>
+          <a:p>
+            <a:pPr algn="ctr"/>
+            <a:r>
+              <a:rPr lang="en-US" dirty="0" smtClean="0">
+                <a:solidFill>
+                  <a:srgbClr val="008000"/>
+                </a:solidFill>
+              </a:rPr>
+              <a:t>(attach GPIO</a:t>
+            </a:r>
+          </a:p>
+          <a:p>
+            <a:pPr algn="ctr"/>
+            <a:r>
+              <a:rPr lang="en-US" dirty="0">
+                <a:solidFill>
+                  <a:srgbClr val="008000"/>
+                </a:solidFill>
+              </a:rPr>
+              <a:t>f</a:t>
+            </a:r>
+            <a:r>
+              <a:rPr lang="en-US" dirty="0" smtClean="0">
+                <a:solidFill>
+                  <a:srgbClr val="008000"/>
+                </a:solidFill>
+              </a:rPr>
+              <a:t>or switched</a:t>
+            </a:r>
+          </a:p>
+          <a:p>
+            <a:pPr algn="ctr"/>
+            <a:r>
+              <a:rPr lang="en-US" dirty="0">
+                <a:solidFill>
+                  <a:srgbClr val="008000"/>
+                </a:solidFill>
+              </a:rPr>
+              <a:t>s</a:t>
+            </a:r>
+            <a:r>
+              <a:rPr lang="en-US" dirty="0" smtClean="0">
+                <a:solidFill>
+                  <a:srgbClr val="008000"/>
+                </a:solidFill>
+              </a:rPr>
+              <a:t>ensor power)</a:t>
+            </a:r>
+            <a:endParaRPr lang="en-US" dirty="0">
+              <a:solidFill>
+                <a:srgbClr val="008000"/>
+              </a:solidFill>
+            </a:endParaRPr>
+          </a:p>
+        </p:txBody>
+      </p:sp>
+      <p:sp>
+        <p:nvSpPr>
+          <p:cNvPr id="30" name="TextBox 29"/>
+          <p:cNvSpPr txBox="1"/>
+          <p:nvPr/>
+        </p:nvSpPr>
+        <p:spPr>
+          <a:xfrm>
+            <a:off x="3026241" y="5600700"/>
+            <a:ext cx="904671" cy="369332"/>
+          </a:xfrm>
+          <a:prstGeom prst="rect">
+            <a:avLst/>
+          </a:prstGeom>
+          <a:noFill/>
+        </p:spPr>
+        <p:txBody>
+          <a:bodyPr wrap="none" rtlCol="0">
+            <a:spAutoFit/>
+          </a:bodyPr>
+          <a:lstStyle/>
+          <a:p>
+            <a:pPr algn="ctr"/>
+            <a:r>
+              <a:rPr lang="en-US" b="1" dirty="0" smtClean="0"/>
+              <a:t>Ground</a:t>
+            </a:r>
+            <a:endParaRPr lang="en-US" b="1" dirty="0"/>
+          </a:p>
+        </p:txBody>
+      </p:sp>
+      <p:sp>
+        <p:nvSpPr>
+          <p:cNvPr id="31" name="Oval 30"/>
+          <p:cNvSpPr/>
+          <p:nvPr/>
+        </p:nvSpPr>
+        <p:spPr>
+          <a:xfrm>
+            <a:off x="2735652" y="3657600"/>
+            <a:ext cx="114704" cy="114704"/>
+          </a:xfrm>
+          <a:prstGeom prst="ellipse">
+            <a:avLst/>
+          </a:prstGeom>
+          <a:noFill/>
+          <a:ln>
+            <a:solidFill>
+              <a:schemeClr val="tx1"/>
+            </a:solidFill>
+          </a:ln>
+        </p:spPr>
+        <p:style>
+          <a:lnRef idx="2">
+            <a:schemeClr val="accent1">
+              <a:shade val="50000"/>
+            </a:schemeClr>
+          </a:lnRef>
+          <a:fillRef idx="1">
+            <a:schemeClr val="accent1"/>
+          </a:fillRef>
+          <a:effectRef idx="0">
+            <a:schemeClr val="accent1"/>
+          </a:effectRef>
+          <a:fontRef idx="minor">
+            <a:schemeClr val="lt1"/>
+          </a:fontRef>
+        </p:style>
+        <p:txBody>
+          <a:bodyPr rtlCol="0" anchor="ctr"/>
+          <a:lstStyle/>
+          <a:p>
+            <a:pPr algn="ctr"/>
+            <a:endParaRPr lang="en-US"/>
+          </a:p>
+        </p:txBody>
+      </p:sp>
+      <p:sp>
+        <p:nvSpPr>
+          <p:cNvPr id="32" name="Oval 31"/>
+          <p:cNvSpPr/>
+          <p:nvPr/>
+        </p:nvSpPr>
+        <p:spPr>
+          <a:xfrm>
+            <a:off x="2730494" y="4298151"/>
+            <a:ext cx="114704" cy="114704"/>
+          </a:xfrm>
+          <a:prstGeom prst="ellipse">
+            <a:avLst/>
+          </a:prstGeom>
+          <a:noFill/>
+          <a:ln>
+            <a:solidFill>
+              <a:srgbClr val="008000"/>
+            </a:solidFill>
+          </a:ln>
+        </p:spPr>
+        <p:style>
+          <a:lnRef idx="2">
+            <a:schemeClr val="accent1">
+              <a:shade val="50000"/>
+            </a:schemeClr>
+          </a:lnRef>
+          <a:fillRef idx="1">
+            <a:schemeClr val="accent1"/>
+          </a:fillRef>
+          <a:effectRef idx="0">
+            <a:schemeClr val="accent1"/>
+          </a:effectRef>
+          <a:fontRef idx="minor">
+            <a:schemeClr val="lt1"/>
+          </a:fontRef>
+        </p:style>
+        <p:txBody>
+          <a:bodyPr rtlCol="0" anchor="ctr"/>
+          <a:lstStyle/>
+          <a:p>
+            <a:pPr algn="ctr"/>
+            <a:endParaRPr lang="en-US"/>
+          </a:p>
+        </p:txBody>
+      </p:sp>
+      <p:cxnSp>
+        <p:nvCxnSpPr>
+          <p:cNvPr id="17" name="Straight Arrow Connector 16"/>
+          <p:cNvCxnSpPr/>
+          <p:nvPr/>
+        </p:nvCxnSpPr>
+        <p:spPr>
+          <a:xfrm flipH="1" flipV="1">
+            <a:off x="3943350" y="3705226"/>
+            <a:ext cx="514350" cy="2009774"/>
+          </a:xfrm>
+          <a:prstGeom prst="straightConnector1">
+            <a:avLst/>
+          </a:prstGeom>
+          <a:ln w="38100">
+            <a:solidFill>
+              <a:srgbClr val="00B0F0"/>
+            </a:solidFill>
+            <a:tailEnd type="arrow"/>
+          </a:ln>
+        </p:spPr>
+        <p:style>
+          <a:lnRef idx="1">
+            <a:schemeClr val="accent1"/>
+          </a:lnRef>
+          <a:fillRef idx="0">
+            <a:schemeClr val="accent1"/>
+          </a:fillRef>
+          <a:effectRef idx="0">
+            <a:schemeClr val="accent1"/>
+          </a:effectRef>
+          <a:fontRef idx="minor">
+            <a:schemeClr val="tx1"/>
+          </a:fontRef>
+        </p:style>
+      </p:cxnSp>
+      <p:sp>
+        <p:nvSpPr>
+          <p:cNvPr id="18" name="TextBox 17"/>
+          <p:cNvSpPr txBox="1"/>
+          <p:nvPr/>
+        </p:nvSpPr>
+        <p:spPr>
+          <a:xfrm>
+            <a:off x="3757762" y="5600700"/>
+            <a:ext cx="1672509" cy="646331"/>
+          </a:xfrm>
+          <a:prstGeom prst="rect">
+            <a:avLst/>
+          </a:prstGeom>
+          <a:noFill/>
+        </p:spPr>
+        <p:txBody>
+          <a:bodyPr wrap="none" rtlCol="0">
+            <a:spAutoFit/>
+          </a:bodyPr>
+          <a:lstStyle/>
+          <a:p>
+            <a:pPr algn="ctr"/>
+            <a:r>
+              <a:rPr lang="en-US" b="1" dirty="0" err="1" smtClean="0">
+                <a:solidFill>
+                  <a:srgbClr val="00B0F0"/>
+                </a:solidFill>
+              </a:rPr>
+              <a:t>Desolder</a:t>
+            </a:r>
+            <a:endParaRPr lang="en-US" b="1" dirty="0">
+              <a:solidFill>
+                <a:srgbClr val="00B0F0"/>
+              </a:solidFill>
+            </a:endParaRPr>
+          </a:p>
+          <a:p>
+            <a:pPr algn="ctr"/>
+            <a:r>
+              <a:rPr lang="en-US" b="1" dirty="0" smtClean="0">
+                <a:solidFill>
+                  <a:srgbClr val="00B0F0"/>
+                </a:solidFill>
+              </a:rPr>
+              <a:t>Microcontroller</a:t>
+            </a:r>
+            <a:endParaRPr lang="en-US" b="1" dirty="0">
+              <a:solidFill>
+                <a:srgbClr val="00B0F0"/>
+              </a:solidFill>
+            </a:endParaRPr>
+          </a:p>
+        </p:txBody>
+      </p:sp>
+      <p:cxnSp>
+        <p:nvCxnSpPr>
+          <p:cNvPr id="21" name="Straight Arrow Connector 20"/>
+          <p:cNvCxnSpPr/>
+          <p:nvPr/>
+        </p:nvCxnSpPr>
+        <p:spPr>
+          <a:xfrm flipH="1" flipV="1">
+            <a:off x="5886450" y="3086100"/>
+            <a:ext cx="228600" cy="2668369"/>
+          </a:xfrm>
+          <a:prstGeom prst="straightConnector1">
+            <a:avLst/>
+          </a:prstGeom>
+          <a:ln w="38100">
+            <a:solidFill>
+              <a:srgbClr val="00B0F0"/>
+            </a:solidFill>
+            <a:tailEnd type="arrow"/>
+          </a:ln>
+        </p:spPr>
+        <p:style>
+          <a:lnRef idx="1">
+            <a:schemeClr val="accent1"/>
+          </a:lnRef>
+          <a:fillRef idx="0">
+            <a:schemeClr val="accent1"/>
+          </a:fillRef>
+          <a:effectRef idx="0">
+            <a:schemeClr val="accent1"/>
+          </a:effectRef>
+          <a:fontRef idx="minor">
+            <a:schemeClr val="tx1"/>
+          </a:fontRef>
+        </p:style>
+      </p:cxnSp>
+      <p:sp>
+        <p:nvSpPr>
+          <p:cNvPr id="22" name="TextBox 21"/>
+          <p:cNvSpPr txBox="1"/>
+          <p:nvPr/>
+        </p:nvSpPr>
+        <p:spPr>
+          <a:xfrm>
+            <a:off x="5469569" y="5640169"/>
+            <a:ext cx="1758238" cy="646331"/>
+          </a:xfrm>
+          <a:prstGeom prst="rect">
+            <a:avLst/>
+          </a:prstGeom>
+          <a:noFill/>
+        </p:spPr>
+        <p:txBody>
+          <a:bodyPr wrap="none" rtlCol="0">
+            <a:spAutoFit/>
+          </a:bodyPr>
+          <a:lstStyle/>
+          <a:p>
+            <a:pPr algn="ctr"/>
+            <a:r>
+              <a:rPr lang="en-US" b="1" dirty="0" err="1" smtClean="0">
+                <a:solidFill>
+                  <a:srgbClr val="00B0F0"/>
+                </a:solidFill>
+              </a:rPr>
+              <a:t>Desolder</a:t>
+            </a:r>
+            <a:endParaRPr lang="en-US" b="1" dirty="0">
+              <a:solidFill>
+                <a:srgbClr val="00B0F0"/>
+              </a:solidFill>
+            </a:endParaRPr>
+          </a:p>
+          <a:p>
+            <a:pPr algn="ctr"/>
+            <a:r>
+              <a:rPr lang="en-US" b="1" dirty="0" smtClean="0">
+                <a:solidFill>
+                  <a:srgbClr val="00B0F0"/>
+                </a:solidFill>
+              </a:rPr>
+              <a:t>Bluetooth Board</a:t>
+            </a:r>
+            <a:endParaRPr lang="en-US" b="1" dirty="0">
+              <a:solidFill>
+                <a:srgbClr val="00B0F0"/>
+              </a:solidFill>
+            </a:endParaRPr>
+          </a:p>
+        </p:txBody>
+      </p:sp>
+      <p:cxnSp>
+        <p:nvCxnSpPr>
+          <p:cNvPr id="23" name="Straight Arrow Connector 22"/>
+          <p:cNvCxnSpPr/>
+          <p:nvPr/>
+        </p:nvCxnSpPr>
+        <p:spPr>
+          <a:xfrm flipH="1" flipV="1">
+            <a:off x="6286500" y="4114802"/>
+            <a:ext cx="1485900" cy="1485898"/>
+          </a:xfrm>
+          <a:prstGeom prst="straightConnector1">
+            <a:avLst/>
+          </a:prstGeom>
+          <a:ln w="38100">
+            <a:solidFill>
+              <a:srgbClr val="FF0000"/>
+            </a:solidFill>
+            <a:tailEnd type="arrow"/>
+          </a:ln>
+        </p:spPr>
+        <p:style>
+          <a:lnRef idx="1">
+            <a:schemeClr val="accent1"/>
+          </a:lnRef>
+          <a:fillRef idx="0">
+            <a:schemeClr val="accent1"/>
+          </a:fillRef>
+          <a:effectRef idx="0">
+            <a:schemeClr val="accent1"/>
+          </a:effectRef>
+          <a:fontRef idx="minor">
+            <a:schemeClr val="tx1"/>
+          </a:fontRef>
+        </p:style>
+      </p:cxnSp>
+      <p:sp>
+        <p:nvSpPr>
+          <p:cNvPr id="24" name="TextBox 23"/>
+          <p:cNvSpPr txBox="1"/>
+          <p:nvPr/>
+        </p:nvSpPr>
+        <p:spPr>
+          <a:xfrm>
+            <a:off x="7275575" y="5508367"/>
+            <a:ext cx="1152944" cy="1200329"/>
+          </a:xfrm>
+          <a:prstGeom prst="rect">
+            <a:avLst/>
+          </a:prstGeom>
+          <a:noFill/>
+        </p:spPr>
+        <p:txBody>
+          <a:bodyPr wrap="none" rtlCol="0">
+            <a:spAutoFit/>
+          </a:bodyPr>
+          <a:lstStyle/>
+          <a:p>
+            <a:pPr algn="ctr"/>
+            <a:r>
+              <a:rPr lang="en-US" b="1" dirty="0" smtClean="0">
+                <a:solidFill>
+                  <a:srgbClr val="C00000"/>
+                </a:solidFill>
+              </a:rPr>
+              <a:t>3.3v</a:t>
+            </a:r>
+          </a:p>
+          <a:p>
+            <a:pPr algn="ctr"/>
+            <a:r>
+              <a:rPr lang="en-US" dirty="0" smtClean="0">
+                <a:solidFill>
+                  <a:srgbClr val="C00000"/>
+                </a:solidFill>
+              </a:rPr>
+              <a:t>(attach to</a:t>
+            </a:r>
+          </a:p>
+          <a:p>
+            <a:pPr algn="ctr"/>
+            <a:r>
+              <a:rPr lang="en-US" dirty="0">
+                <a:solidFill>
+                  <a:srgbClr val="C00000"/>
+                </a:solidFill>
+              </a:rPr>
+              <a:t>p</a:t>
+            </a:r>
+            <a:r>
+              <a:rPr lang="en-US" dirty="0" smtClean="0">
+                <a:solidFill>
+                  <a:srgbClr val="C00000"/>
+                </a:solidFill>
+              </a:rPr>
+              <a:t>ower the</a:t>
+            </a:r>
+          </a:p>
+          <a:p>
+            <a:pPr algn="ctr"/>
+            <a:r>
+              <a:rPr lang="en-US" dirty="0" smtClean="0">
+                <a:solidFill>
+                  <a:srgbClr val="C00000"/>
+                </a:solidFill>
+              </a:rPr>
+              <a:t>ESP8266)</a:t>
+            </a:r>
+            <a:endParaRPr lang="en-US" dirty="0">
+              <a:solidFill>
+                <a:srgbClr val="C00000"/>
+              </a:solidFill>
+            </a:endParaRPr>
+          </a:p>
+        </p:txBody>
+      </p:sp>
+      <p:sp>
+        <p:nvSpPr>
+          <p:cNvPr id="27" name="Oval 26"/>
+          <p:cNvSpPr/>
+          <p:nvPr/>
+        </p:nvSpPr>
+        <p:spPr>
+          <a:xfrm>
+            <a:off x="6057899" y="3886199"/>
+            <a:ext cx="290787" cy="290787"/>
+          </a:xfrm>
+          <a:prstGeom prst="ellipse">
+            <a:avLst/>
+          </a:prstGeom>
+          <a:noFill/>
+          <a:ln>
+            <a:solidFill>
+              <a:srgbClr val="FF0000"/>
+            </a:solidFill>
+          </a:ln>
+        </p:spPr>
+        <p:style>
+          <a:lnRef idx="2">
+            <a:schemeClr val="accent1">
+              <a:shade val="50000"/>
+            </a:schemeClr>
+          </a:lnRef>
+          <a:fillRef idx="1">
+            <a:schemeClr val="accent1"/>
+          </a:fillRef>
+          <a:effectRef idx="0">
+            <a:schemeClr val="accent1"/>
+          </a:effectRef>
+          <a:fontRef idx="minor">
+            <a:schemeClr val="lt1"/>
+          </a:fontRef>
+        </p:style>
+        <p:txBody>
+          <a:bodyPr rtlCol="0" anchor="ctr"/>
+          <a:lstStyle/>
+          <a:p>
+            <a:pPr algn="ctr"/>
+            <a:endParaRPr lang="en-US"/>
+          </a:p>
+        </p:txBody>
+      </p:sp>
+      <p:cxnSp>
+        <p:nvCxnSpPr>
+          <p:cNvPr id="35" name="Straight Arrow Connector 34"/>
+          <p:cNvCxnSpPr/>
+          <p:nvPr/>
+        </p:nvCxnSpPr>
+        <p:spPr>
+          <a:xfrm flipV="1">
+            <a:off x="2281238" y="4390456"/>
+            <a:ext cx="514350" cy="1265019"/>
+          </a:xfrm>
+          <a:prstGeom prst="straightConnector1">
+            <a:avLst/>
+          </a:prstGeom>
+          <a:ln w="38100">
+            <a:solidFill>
+              <a:srgbClr val="008000"/>
+            </a:solidFill>
+            <a:tailEnd type="arrow"/>
+          </a:ln>
+        </p:spPr>
+        <p:style>
+          <a:lnRef idx="1">
+            <a:schemeClr val="accent1"/>
+          </a:lnRef>
+          <a:fillRef idx="0">
+            <a:schemeClr val="accent1"/>
+          </a:fillRef>
+          <a:effectRef idx="0">
+            <a:schemeClr val="accent1"/>
+          </a:effectRef>
+          <a:fontRef idx="minor">
+            <a:schemeClr val="tx1"/>
+          </a:fontRef>
+        </p:style>
+      </p:cxnSp>
+      <p:cxnSp>
+        <p:nvCxnSpPr>
+          <p:cNvPr id="36" name="Straight Arrow Connector 35"/>
+          <p:cNvCxnSpPr/>
+          <p:nvPr/>
+        </p:nvCxnSpPr>
+        <p:spPr>
+          <a:xfrm>
+            <a:off x="2278855" y="1619252"/>
+            <a:ext cx="1128713" cy="1295162"/>
+          </a:xfrm>
+          <a:prstGeom prst="straightConnector1">
+            <a:avLst/>
+          </a:prstGeom>
+          <a:ln w="38100">
+            <a:solidFill>
+              <a:srgbClr val="FFFF00"/>
+            </a:solidFill>
+            <a:tailEnd type="arrow"/>
+          </a:ln>
+        </p:spPr>
+        <p:style>
+          <a:lnRef idx="1">
+            <a:schemeClr val="accent1"/>
+          </a:lnRef>
+          <a:fillRef idx="0">
+            <a:schemeClr val="accent1"/>
+          </a:fillRef>
+          <a:effectRef idx="0">
+            <a:schemeClr val="accent1"/>
+          </a:effectRef>
+          <a:fontRef idx="minor">
+            <a:schemeClr val="tx1"/>
+          </a:fontRef>
+        </p:style>
+      </p:cxnSp>
+    </p:spTree>
+    <p:extLst>
+      <p:ext uri="{BB962C8B-B14F-4D97-AF65-F5344CB8AC3E}">
+        <p14:creationId xmlns:p14="http://schemas.microsoft.com/office/powerpoint/2010/main" val="667297604"/>
+      </p:ext>
+    </p:extLst>
+  </p:cSld>
+  <p:clrMapOvr>
+    <a:masterClrMapping/>
+  </p:clrMapOvr>
+  <p:timing>
+    <p:tnLst>
+      <p:par>
+        <p:cTn id="1" dur="indefinite" restart="never" nodeType="tmRoot"/>
+      </p:par>
+    </p:tnLst>
+  </p:timing>
+</p:sld>
+</file>
+
+<file path=ppt/slides/slide3.xml><?xml version="1.0" encoding="utf-8"?>
+<p:sld xmlns:a="http://schemas.openxmlformats.org/drawingml/2006/main" xmlns:r="http://schemas.openxmlformats.org/officeDocument/2006/relationships" xmlns:p="http://schemas.openxmlformats.org/presentationml/2006/main">
+  <p:cSld>
+    <p:spTree>
+      <p:nvGrpSpPr>
+        <p:cNvPr id="1" name=""/>
+        <p:cNvGrpSpPr/>
+        <p:nvPr/>
+      </p:nvGrpSpPr>
+      <p:grpSpPr>
+        <a:xfrm>
+          <a:off x="0" y="0"/>
+          <a:ext cx="0" cy="0"/>
+          <a:chOff x="0" y="0"/>
+          <a:chExt cx="0" cy="0"/>
+        </a:xfrm>
+      </p:grpSpPr>
+      <p:pic>
+        <p:nvPicPr>
+          <p:cNvPr id="1027" name="Picture 3"/>
+          <p:cNvPicPr>
+            <a:picLocks noChangeAspect="1" noChangeArrowheads="1"/>
+          </p:cNvPicPr>
+          <p:nvPr/>
+        </p:nvPicPr>
+        <p:blipFill>
+          <a:blip r:embed="rId2" cstate="print">
+            <a:extLst>
+              <a:ext uri="{28A0092B-C50C-407E-A947-70E740481C1C}">
+                <a14:useLocalDpi xmlns:a14="http://schemas.microsoft.com/office/drawing/2010/main" val="0"/>
+              </a:ext>
+            </a:extLst>
+          </a:blip>
+          <a:srcRect/>
+          <a:stretch>
+            <a:fillRect/>
+          </a:stretch>
+        </p:blipFill>
+        <p:spPr bwMode="auto">
+          <a:xfrm>
+            <a:off x="0" y="685800"/>
+            <a:ext cx="9144000" cy="4528062"/>
+          </a:xfrm>
+          <a:prstGeom prst="rect">
+            <a:avLst/>
+          </a:prstGeom>
+          <a:noFill/>
+          <a:ln>
+            <a:noFill/>
+          </a:ln>
+          <a:effectLst/>
+          <a:extLst>
+            <a:ext uri="{909E8E84-426E-40DD-AFC4-6F175D3DCCD1}">
+              <a14:hiddenFill xmlns:a14="http://schemas.microsoft.com/office/drawing/2010/main">
+                <a:solidFill>
+                  <a:schemeClr val="accent1"/>
+                </a:solidFill>
+              </a14:hiddenFill>
+            </a:ext>
+            <a:ext uri="{91240B29-F687-4F45-9708-019B960494DF}">
+              <a14:hiddenLine xmlns:a14="http://schemas.microsoft.com/office/drawing/2010/main" w="9525">
+                <a:solidFill>
+                  <a:schemeClr val="tx1"/>
+                </a:solidFill>
+                <a:miter lim="800000"/>
+                <a:headEnd/>
+                <a:tailEnd/>
+              </a14:hiddenLine>
+            </a:ext>
+            <a:ext uri="{AF507438-7753-43E0-B8FC-AC1667EBCBE1}">
+              <a14:hiddenEffects xmlns:a14="http://schemas.microsoft.com/office/drawing/2010/main">
+                <a:effectLst>
+                  <a:outerShdw dist="35921" dir="2700000" algn="ctr" rotWithShape="0">
+                    <a:schemeClr val="bg2"/>
+                  </a:outerShdw>
+                </a:effectLst>
+              </a14:hiddenEffects>
+            </a:ext>
+          </a:extLst>
+        </p:spPr>
+      </p:pic>
+      <p:sp>
+        <p:nvSpPr>
+          <p:cNvPr id="5" name="TextBox 4"/>
+          <p:cNvSpPr txBox="1"/>
+          <p:nvPr/>
+        </p:nvSpPr>
+        <p:spPr>
+          <a:xfrm rot="16200000">
+            <a:off x="5143500" y="4021455"/>
+            <a:ext cx="325730" cy="400110"/>
+          </a:xfrm>
+          <a:prstGeom prst="rect">
+            <a:avLst/>
+          </a:prstGeom>
+          <a:noFill/>
+        </p:spPr>
+        <p:txBody>
+          <a:bodyPr wrap="none" rtlCol="0">
+            <a:spAutoFit/>
+          </a:bodyPr>
+          <a:lstStyle/>
+          <a:p>
+            <a:r>
+              <a:rPr lang="en-US" sz="2000" b="1" dirty="0" smtClean="0">
+                <a:solidFill>
+                  <a:srgbClr val="FF0000"/>
+                </a:solidFill>
+              </a:rPr>
+              <a:t>X</a:t>
+            </a:r>
+            <a:endParaRPr lang="en-US" sz="2000" b="1" dirty="0">
+              <a:solidFill>
+                <a:srgbClr val="FF0000"/>
+              </a:solidFill>
+            </a:endParaRPr>
+          </a:p>
+        </p:txBody>
+      </p:sp>
+      <p:cxnSp>
+        <p:nvCxnSpPr>
+          <p:cNvPr id="8" name="Straight Arrow Connector 7"/>
+          <p:cNvCxnSpPr/>
+          <p:nvPr/>
+        </p:nvCxnSpPr>
+        <p:spPr>
+          <a:xfrm flipV="1">
+            <a:off x="3314700" y="4200525"/>
+            <a:ext cx="1914525" cy="1543053"/>
+          </a:xfrm>
+          <a:prstGeom prst="straightConnector1">
+            <a:avLst/>
+          </a:prstGeom>
+          <a:ln w="38100">
+            <a:solidFill>
+              <a:srgbClr val="FF0000"/>
+            </a:solidFill>
+            <a:tailEnd type="arrow"/>
+          </a:ln>
+        </p:spPr>
+        <p:style>
+          <a:lnRef idx="1">
+            <a:schemeClr val="accent1"/>
+          </a:lnRef>
+          <a:fillRef idx="0">
+            <a:schemeClr val="accent1"/>
+          </a:fillRef>
+          <a:effectRef idx="0">
+            <a:schemeClr val="accent1"/>
+          </a:effectRef>
+          <a:fontRef idx="minor">
+            <a:schemeClr val="tx1"/>
+          </a:fontRef>
+        </p:style>
+      </p:cxnSp>
+      <p:sp>
+        <p:nvSpPr>
+          <p:cNvPr id="9" name="TextBox 8"/>
+          <p:cNvSpPr txBox="1"/>
+          <p:nvPr/>
+        </p:nvSpPr>
+        <p:spPr>
+          <a:xfrm>
+            <a:off x="2382974" y="5640169"/>
+            <a:ext cx="1676164" cy="1200329"/>
+          </a:xfrm>
+          <a:prstGeom prst="rect">
+            <a:avLst/>
+          </a:prstGeom>
+          <a:noFill/>
+        </p:spPr>
+        <p:txBody>
+          <a:bodyPr wrap="none" rtlCol="0">
+            <a:spAutoFit/>
+          </a:bodyPr>
+          <a:lstStyle/>
+          <a:p>
+            <a:pPr algn="ctr"/>
+            <a:r>
+              <a:rPr lang="en-US" dirty="0" smtClean="0">
+                <a:solidFill>
+                  <a:srgbClr val="C00000"/>
+                </a:solidFill>
+              </a:rPr>
+              <a:t>Cut this 3.3v</a:t>
+            </a:r>
+          </a:p>
+          <a:p>
+            <a:pPr algn="ctr"/>
+            <a:r>
+              <a:rPr lang="en-US" dirty="0" smtClean="0">
+                <a:solidFill>
+                  <a:srgbClr val="C00000"/>
+                </a:solidFill>
+              </a:rPr>
+              <a:t>trace to allow</a:t>
+            </a:r>
+          </a:p>
+          <a:p>
+            <a:pPr algn="ctr"/>
+            <a:r>
+              <a:rPr lang="en-US" dirty="0" smtClean="0">
+                <a:solidFill>
+                  <a:srgbClr val="C00000"/>
+                </a:solidFill>
+              </a:rPr>
+              <a:t>switched power</a:t>
+            </a:r>
+          </a:p>
+          <a:p>
+            <a:pPr algn="ctr"/>
+            <a:r>
+              <a:rPr lang="en-US" dirty="0">
+                <a:solidFill>
+                  <a:srgbClr val="C00000"/>
+                </a:solidFill>
+              </a:rPr>
+              <a:t>t</a:t>
+            </a:r>
+            <a:r>
+              <a:rPr lang="en-US" dirty="0" smtClean="0">
+                <a:solidFill>
+                  <a:srgbClr val="C00000"/>
+                </a:solidFill>
+              </a:rPr>
+              <a:t>o sensors</a:t>
+            </a:r>
+          </a:p>
+        </p:txBody>
+      </p:sp>
+      <p:cxnSp>
+        <p:nvCxnSpPr>
+          <p:cNvPr id="13" name="Straight Arrow Connector 12"/>
+          <p:cNvCxnSpPr/>
+          <p:nvPr/>
+        </p:nvCxnSpPr>
+        <p:spPr>
+          <a:xfrm flipV="1">
+            <a:off x="5486400" y="5213863"/>
+            <a:ext cx="0" cy="501137"/>
+          </a:xfrm>
+          <a:prstGeom prst="straightConnector1">
+            <a:avLst/>
+          </a:prstGeom>
+          <a:ln w="38100">
+            <a:solidFill>
+              <a:schemeClr val="bg1">
+                <a:lumMod val="50000"/>
+              </a:schemeClr>
+            </a:solidFill>
+            <a:tailEnd type="arrow"/>
+          </a:ln>
+        </p:spPr>
+        <p:style>
+          <a:lnRef idx="1">
+            <a:schemeClr val="accent1"/>
+          </a:lnRef>
+          <a:fillRef idx="0">
+            <a:schemeClr val="accent1"/>
+          </a:fillRef>
+          <a:effectRef idx="0">
+            <a:schemeClr val="accent1"/>
+          </a:effectRef>
+          <a:fontRef idx="minor">
+            <a:schemeClr val="tx1"/>
+          </a:fontRef>
+        </p:style>
+      </p:cxnSp>
+      <p:sp>
+        <p:nvSpPr>
+          <p:cNvPr id="14" name="TextBox 13"/>
+          <p:cNvSpPr txBox="1"/>
+          <p:nvPr/>
+        </p:nvSpPr>
+        <p:spPr>
+          <a:xfrm>
+            <a:off x="4397248" y="5600700"/>
+            <a:ext cx="1712520" cy="830997"/>
+          </a:xfrm>
+          <a:prstGeom prst="rect">
+            <a:avLst/>
+          </a:prstGeom>
+          <a:noFill/>
+        </p:spPr>
+        <p:txBody>
+          <a:bodyPr wrap="none" rtlCol="0">
+            <a:spAutoFit/>
+          </a:bodyPr>
+          <a:lstStyle/>
+          <a:p>
+            <a:pPr algn="ctr"/>
+            <a:r>
+              <a:rPr lang="en-US" sz="1200" dirty="0" smtClean="0">
+                <a:solidFill>
+                  <a:schemeClr val="bg1">
+                    <a:lumMod val="50000"/>
+                  </a:schemeClr>
+                </a:solidFill>
+              </a:rPr>
+              <a:t>Unused switch – keep to</a:t>
+            </a:r>
+          </a:p>
+          <a:p>
+            <a:pPr algn="ctr"/>
+            <a:r>
+              <a:rPr lang="en-US" sz="1200" dirty="0" smtClean="0">
+                <a:solidFill>
+                  <a:schemeClr val="bg1">
+                    <a:lumMod val="50000"/>
+                  </a:schemeClr>
+                </a:solidFill>
+              </a:rPr>
+              <a:t>this position to avoid</a:t>
+            </a:r>
+          </a:p>
+          <a:p>
+            <a:pPr algn="ctr"/>
+            <a:r>
+              <a:rPr lang="en-US" sz="1200" dirty="0" smtClean="0">
+                <a:solidFill>
+                  <a:schemeClr val="bg1">
+                    <a:lumMod val="50000"/>
+                  </a:schemeClr>
+                </a:solidFill>
+              </a:rPr>
+              <a:t>power drain, was </a:t>
+            </a:r>
+            <a:r>
+              <a:rPr lang="en-US" sz="1200" dirty="0" smtClean="0">
+                <a:solidFill>
+                  <a:schemeClr val="bg1">
+                    <a:lumMod val="50000"/>
+                  </a:schemeClr>
+                </a:solidFill>
+              </a:rPr>
+              <a:t>to old</a:t>
+            </a:r>
+            <a:endParaRPr lang="en-US" sz="1200" dirty="0" smtClean="0">
+              <a:solidFill>
+                <a:schemeClr val="bg1">
+                  <a:lumMod val="50000"/>
+                </a:schemeClr>
+              </a:solidFill>
+            </a:endParaRPr>
+          </a:p>
+          <a:p>
+            <a:pPr algn="ctr"/>
+            <a:r>
+              <a:rPr lang="en-US" sz="1200" dirty="0" smtClean="0">
+                <a:solidFill>
+                  <a:schemeClr val="bg1">
+                    <a:lumMod val="50000"/>
+                  </a:schemeClr>
+                </a:solidFill>
+              </a:rPr>
+              <a:t>microcontroller pull-up</a:t>
+            </a:r>
+          </a:p>
+        </p:txBody>
+      </p:sp>
+      <p:cxnSp>
+        <p:nvCxnSpPr>
+          <p:cNvPr id="17" name="Straight Arrow Connector 16"/>
+          <p:cNvCxnSpPr/>
+          <p:nvPr/>
+        </p:nvCxnSpPr>
+        <p:spPr>
+          <a:xfrm flipH="1" flipV="1">
+            <a:off x="6366438" y="4200526"/>
+            <a:ext cx="834462" cy="1171574"/>
+          </a:xfrm>
+          <a:prstGeom prst="straightConnector1">
+            <a:avLst/>
+          </a:prstGeom>
+          <a:ln w="63500">
+            <a:solidFill>
+              <a:schemeClr val="bg1"/>
+            </a:solidFill>
+            <a:tailEnd type="arrow" w="sm" len="sm"/>
+          </a:ln>
+        </p:spPr>
+        <p:style>
+          <a:lnRef idx="1">
+            <a:schemeClr val="accent1"/>
+          </a:lnRef>
+          <a:fillRef idx="0">
+            <a:schemeClr val="accent1"/>
+          </a:fillRef>
+          <a:effectRef idx="0">
+            <a:schemeClr val="accent1"/>
+          </a:effectRef>
+          <a:fontRef idx="minor">
+            <a:schemeClr val="tx1"/>
+          </a:fontRef>
+        </p:style>
+      </p:cxnSp>
+      <p:cxnSp>
+        <p:nvCxnSpPr>
+          <p:cNvPr id="18" name="Straight Arrow Connector 17"/>
+          <p:cNvCxnSpPr/>
+          <p:nvPr/>
+        </p:nvCxnSpPr>
+        <p:spPr>
+          <a:xfrm flipH="1" flipV="1">
+            <a:off x="6366438" y="3556874"/>
+            <a:ext cx="1863162" cy="1828560"/>
+          </a:xfrm>
+          <a:prstGeom prst="straightConnector1">
+            <a:avLst/>
+          </a:prstGeom>
+          <a:ln w="38100">
+            <a:solidFill>
+              <a:schemeClr val="tx1"/>
+            </a:solidFill>
+            <a:tailEnd type="arrow"/>
+          </a:ln>
+        </p:spPr>
+        <p:style>
+          <a:lnRef idx="1">
+            <a:schemeClr val="accent1"/>
+          </a:lnRef>
+          <a:fillRef idx="0">
+            <a:schemeClr val="accent1"/>
+          </a:fillRef>
+          <a:effectRef idx="0">
+            <a:schemeClr val="accent1"/>
+          </a:effectRef>
+          <a:fontRef idx="minor">
+            <a:schemeClr val="tx1"/>
+          </a:fontRef>
+        </p:style>
+      </p:cxnSp>
+      <p:sp>
+        <p:nvSpPr>
+          <p:cNvPr id="20" name="TextBox 19"/>
+          <p:cNvSpPr txBox="1"/>
+          <p:nvPr/>
+        </p:nvSpPr>
+        <p:spPr>
+          <a:xfrm>
+            <a:off x="6286500" y="5292968"/>
+            <a:ext cx="2700035" cy="1477328"/>
+          </a:xfrm>
+          <a:prstGeom prst="rect">
+            <a:avLst/>
+          </a:prstGeom>
+          <a:noFill/>
+        </p:spPr>
+        <p:txBody>
+          <a:bodyPr wrap="none" rtlCol="0">
+            <a:spAutoFit/>
+          </a:bodyPr>
+          <a:lstStyle/>
+          <a:p>
+            <a:pPr algn="ctr"/>
+            <a:r>
+              <a:rPr lang="en-US" b="1" dirty="0" smtClean="0">
+                <a:solidFill>
+                  <a:srgbClr val="008000"/>
+                </a:solidFill>
+              </a:rPr>
+              <a:t>Sensor 3.3v </a:t>
+            </a:r>
+            <a:r>
+              <a:rPr lang="en-US" b="1" dirty="0" err="1" smtClean="0">
+                <a:solidFill>
+                  <a:srgbClr val="008000"/>
+                </a:solidFill>
+              </a:rPr>
+              <a:t>Pwr</a:t>
+            </a:r>
+            <a:r>
+              <a:rPr lang="en-US" b="1" dirty="0" smtClean="0"/>
+              <a:t>     </a:t>
+            </a:r>
+            <a:r>
+              <a:rPr lang="en-US" b="1" dirty="0" smtClean="0"/>
+              <a:t>Ground</a:t>
+            </a:r>
+          </a:p>
+          <a:p>
+            <a:pPr algn="ctr"/>
+            <a:r>
+              <a:rPr lang="en-US" dirty="0" smtClean="0"/>
+              <a:t>Tap these points</a:t>
+            </a:r>
+          </a:p>
+          <a:p>
+            <a:pPr algn="ctr"/>
+            <a:r>
+              <a:rPr lang="en-US" dirty="0"/>
+              <a:t>t</a:t>
+            </a:r>
+            <a:r>
+              <a:rPr lang="en-US" dirty="0" smtClean="0"/>
+              <a:t>o install capacitor</a:t>
+            </a:r>
+          </a:p>
+          <a:p>
+            <a:pPr algn="ctr"/>
+            <a:r>
+              <a:rPr lang="en-US" dirty="0" smtClean="0"/>
+              <a:t>for sensor stability, and</a:t>
+            </a:r>
+          </a:p>
+          <a:p>
+            <a:pPr algn="ctr"/>
+            <a:r>
+              <a:rPr lang="en-US" dirty="0"/>
+              <a:t>t</a:t>
+            </a:r>
+            <a:r>
+              <a:rPr lang="en-US" dirty="0" smtClean="0"/>
+              <a:t>o power temp sensor</a:t>
+            </a:r>
+            <a:endParaRPr lang="en-US" dirty="0"/>
+          </a:p>
+        </p:txBody>
+      </p:sp>
+      <p:sp>
+        <p:nvSpPr>
+          <p:cNvPr id="21" name="Oval 20"/>
+          <p:cNvSpPr/>
+          <p:nvPr/>
+        </p:nvSpPr>
+        <p:spPr>
+          <a:xfrm>
+            <a:off x="6301740" y="3509248"/>
+            <a:ext cx="114704" cy="114704"/>
+          </a:xfrm>
+          <a:prstGeom prst="ellipse">
+            <a:avLst/>
+          </a:prstGeom>
+          <a:noFill/>
+          <a:ln>
+            <a:solidFill>
+              <a:schemeClr val="tx1"/>
+            </a:solidFill>
+          </a:ln>
+        </p:spPr>
+        <p:style>
+          <a:lnRef idx="2">
+            <a:schemeClr val="accent1">
+              <a:shade val="50000"/>
+            </a:schemeClr>
+          </a:lnRef>
+          <a:fillRef idx="1">
+            <a:schemeClr val="accent1"/>
+          </a:fillRef>
+          <a:effectRef idx="0">
+            <a:schemeClr val="accent1"/>
+          </a:effectRef>
+          <a:fontRef idx="minor">
+            <a:schemeClr val="lt1"/>
+          </a:fontRef>
+        </p:style>
+        <p:txBody>
+          <a:bodyPr rtlCol="0" anchor="ctr"/>
+          <a:lstStyle/>
+          <a:p>
+            <a:pPr algn="ctr"/>
+            <a:endParaRPr lang="en-US"/>
+          </a:p>
+        </p:txBody>
+      </p:sp>
+      <p:sp>
+        <p:nvSpPr>
+          <p:cNvPr id="22" name="Oval 21"/>
+          <p:cNvSpPr/>
+          <p:nvPr/>
+        </p:nvSpPr>
+        <p:spPr>
+          <a:xfrm>
+            <a:off x="6301336" y="4145280"/>
+            <a:ext cx="114704" cy="114704"/>
+          </a:xfrm>
+          <a:prstGeom prst="ellipse">
+            <a:avLst/>
+          </a:prstGeom>
+          <a:noFill/>
+          <a:ln>
+            <a:solidFill>
+              <a:srgbClr val="008000"/>
+            </a:solidFill>
+          </a:ln>
+        </p:spPr>
+        <p:style>
+          <a:lnRef idx="2">
+            <a:schemeClr val="accent1">
+              <a:shade val="50000"/>
+            </a:schemeClr>
+          </a:lnRef>
+          <a:fillRef idx="1">
+            <a:schemeClr val="accent1"/>
+          </a:fillRef>
+          <a:effectRef idx="0">
+            <a:schemeClr val="accent1"/>
+          </a:effectRef>
+          <a:fontRef idx="minor">
+            <a:schemeClr val="lt1"/>
+          </a:fontRef>
+        </p:style>
+        <p:txBody>
+          <a:bodyPr rtlCol="0" anchor="ctr"/>
+          <a:lstStyle/>
+          <a:p>
+            <a:pPr algn="ctr"/>
+            <a:endParaRPr lang="en-US"/>
+          </a:p>
+        </p:txBody>
+      </p:sp>
+      <p:cxnSp>
+        <p:nvCxnSpPr>
+          <p:cNvPr id="35" name="Straight Arrow Connector 34"/>
+          <p:cNvCxnSpPr/>
+          <p:nvPr/>
+        </p:nvCxnSpPr>
+        <p:spPr>
+          <a:xfrm flipV="1">
+            <a:off x="1143000" y="4133853"/>
+            <a:ext cx="2724150" cy="1330578"/>
+          </a:xfrm>
+          <a:prstGeom prst="straightConnector1">
+            <a:avLst/>
+          </a:prstGeom>
+          <a:ln w="38100">
+            <a:solidFill>
+              <a:schemeClr val="accent2">
+                <a:lumMod val="40000"/>
+                <a:lumOff val="60000"/>
+              </a:schemeClr>
+            </a:solidFill>
+            <a:tailEnd type="arrow"/>
+          </a:ln>
+        </p:spPr>
+        <p:style>
+          <a:lnRef idx="1">
+            <a:schemeClr val="accent1"/>
+          </a:lnRef>
+          <a:fillRef idx="0">
+            <a:schemeClr val="accent1"/>
+          </a:fillRef>
+          <a:effectRef idx="0">
+            <a:schemeClr val="accent1"/>
+          </a:effectRef>
+          <a:fontRef idx="minor">
+            <a:schemeClr val="tx1"/>
+          </a:fontRef>
+        </p:style>
+      </p:cxnSp>
+      <p:sp>
+        <p:nvSpPr>
+          <p:cNvPr id="36" name="Oval 35"/>
+          <p:cNvSpPr/>
+          <p:nvPr/>
+        </p:nvSpPr>
+        <p:spPr>
+          <a:xfrm>
+            <a:off x="3796896" y="4095750"/>
+            <a:ext cx="114704" cy="114704"/>
+          </a:xfrm>
+          <a:prstGeom prst="ellipse">
+            <a:avLst/>
+          </a:prstGeom>
+          <a:noFill/>
+          <a:ln>
+            <a:solidFill>
+              <a:srgbClr val="FF0000"/>
+            </a:solidFill>
+          </a:ln>
+        </p:spPr>
+        <p:style>
+          <a:lnRef idx="2">
+            <a:schemeClr val="accent1">
+              <a:shade val="50000"/>
+            </a:schemeClr>
+          </a:lnRef>
+          <a:fillRef idx="1">
+            <a:schemeClr val="accent1"/>
+          </a:fillRef>
+          <a:effectRef idx="0">
+            <a:schemeClr val="accent1"/>
+          </a:effectRef>
+          <a:fontRef idx="minor">
+            <a:schemeClr val="lt1"/>
+          </a:fontRef>
+        </p:style>
+        <p:txBody>
+          <a:bodyPr rtlCol="0" anchor="ctr"/>
+          <a:lstStyle/>
+          <a:p>
+            <a:pPr algn="ctr"/>
+            <a:endParaRPr lang="en-US"/>
+          </a:p>
+        </p:txBody>
+      </p:sp>
+      <p:sp>
+        <p:nvSpPr>
+          <p:cNvPr id="37" name="TextBox 36"/>
+          <p:cNvSpPr txBox="1"/>
+          <p:nvPr/>
+        </p:nvSpPr>
+        <p:spPr>
+          <a:xfrm>
+            <a:off x="204285" y="5380672"/>
+            <a:ext cx="1675523" cy="1477328"/>
+          </a:xfrm>
+          <a:prstGeom prst="rect">
+            <a:avLst/>
+          </a:prstGeom>
+          <a:noFill/>
+        </p:spPr>
+        <p:txBody>
+          <a:bodyPr wrap="none" rtlCol="0">
+            <a:spAutoFit/>
+          </a:bodyPr>
+          <a:lstStyle/>
+          <a:p>
+            <a:pPr algn="ctr"/>
+            <a:r>
+              <a:rPr lang="en-US" dirty="0" smtClean="0">
+                <a:solidFill>
+                  <a:schemeClr val="accent2">
+                    <a:lumMod val="40000"/>
+                    <a:lumOff val="60000"/>
+                  </a:schemeClr>
+                </a:solidFill>
+              </a:rPr>
+              <a:t>NOTE:</a:t>
+            </a:r>
+          </a:p>
+          <a:p>
+            <a:pPr algn="ctr"/>
+            <a:r>
+              <a:rPr lang="en-US" dirty="0" smtClean="0">
+                <a:solidFill>
+                  <a:schemeClr val="accent2">
+                    <a:lumMod val="40000"/>
+                    <a:lumOff val="60000"/>
+                  </a:schemeClr>
+                </a:solidFill>
+              </a:rPr>
+              <a:t>Regulated 3.3v</a:t>
+            </a:r>
+          </a:p>
+          <a:p>
+            <a:pPr algn="ctr"/>
+            <a:r>
+              <a:rPr lang="en-US" dirty="0" smtClean="0">
+                <a:solidFill>
+                  <a:schemeClr val="accent2">
+                    <a:lumMod val="40000"/>
+                    <a:lumOff val="60000"/>
+                  </a:schemeClr>
+                </a:solidFill>
+              </a:rPr>
+              <a:t>(supplies power</a:t>
+            </a:r>
+          </a:p>
+          <a:p>
+            <a:pPr algn="ctr"/>
+            <a:r>
+              <a:rPr lang="en-US" dirty="0">
+                <a:solidFill>
+                  <a:schemeClr val="accent2">
+                    <a:lumMod val="40000"/>
+                    <a:lumOff val="60000"/>
+                  </a:schemeClr>
+                </a:solidFill>
+              </a:rPr>
+              <a:t>t</a:t>
+            </a:r>
+            <a:r>
+              <a:rPr lang="en-US" dirty="0" smtClean="0">
+                <a:solidFill>
+                  <a:schemeClr val="accent2">
+                    <a:lumMod val="40000"/>
+                    <a:lumOff val="60000"/>
+                  </a:schemeClr>
+                </a:solidFill>
+              </a:rPr>
+              <a:t>o the trace I</a:t>
+            </a:r>
+          </a:p>
+          <a:p>
+            <a:pPr algn="ctr"/>
+            <a:r>
+              <a:rPr lang="en-US" dirty="0" smtClean="0">
+                <a:solidFill>
+                  <a:schemeClr val="accent2">
+                    <a:lumMod val="40000"/>
+                    <a:lumOff val="60000"/>
+                  </a:schemeClr>
+                </a:solidFill>
+              </a:rPr>
+              <a:t>said to cut)</a:t>
+            </a:r>
+          </a:p>
+        </p:txBody>
+      </p:sp>
+      <p:cxnSp>
+        <p:nvCxnSpPr>
+          <p:cNvPr id="41" name="Straight Arrow Connector 40"/>
+          <p:cNvCxnSpPr/>
+          <p:nvPr/>
+        </p:nvCxnSpPr>
+        <p:spPr>
+          <a:xfrm flipH="1" flipV="1">
+            <a:off x="6377940" y="4213860"/>
+            <a:ext cx="834462" cy="1171574"/>
+          </a:xfrm>
+          <a:prstGeom prst="straightConnector1">
+            <a:avLst/>
+          </a:prstGeom>
+          <a:ln w="38100">
+            <a:solidFill>
+              <a:srgbClr val="008000"/>
+            </a:solidFill>
+            <a:tailEnd type="arrow"/>
+          </a:ln>
+        </p:spPr>
+        <p:style>
+          <a:lnRef idx="1">
+            <a:schemeClr val="accent1"/>
+          </a:lnRef>
+          <a:fillRef idx="0">
+            <a:schemeClr val="accent1"/>
+          </a:fillRef>
+          <a:effectRef idx="0">
+            <a:schemeClr val="accent1"/>
+          </a:effectRef>
+          <a:fontRef idx="minor">
+            <a:schemeClr val="tx1"/>
+          </a:fontRef>
+        </p:style>
+      </p:cxnSp>
+    </p:spTree>
+    <p:extLst>
+      <p:ext uri="{BB962C8B-B14F-4D97-AF65-F5344CB8AC3E}">
+        <p14:creationId xmlns:p14="http://schemas.microsoft.com/office/powerpoint/2010/main" val="588222633"/>
+      </p:ext>
+    </p:extLst>
+  </p:cSld>
+  <p:clrMapOvr>
+    <a:masterClrMapping/>
+  </p:clrMapOvr>
+  <p:timing>
+    <p:tnLst>
+      <p:par>
+        <p:cTn id="1" dur="indefinite" restart="never" nodeType="tmRoot"/>
+      </p:par>
+    </p:tnLst>
+  </p:timing>
+</p:sld>
+</file>
+
+<file path=ppt/slides/slide4.xml><?xml version="1.0" encoding="utf-8"?>
+<p:sld xmlns:a="http://schemas.openxmlformats.org/drawingml/2006/main" xmlns:r="http://schemas.openxmlformats.org/officeDocument/2006/relationships" xmlns:p="http://schemas.openxmlformats.org/presentationml/2006/main">
+  <p:cSld>
+    <p:spTree>
+      <p:nvGrpSpPr>
+        <p:cNvPr id="1" name=""/>
+        <p:cNvGrpSpPr/>
+        <p:nvPr/>
+      </p:nvGrpSpPr>
+      <p:grpSpPr>
+        <a:xfrm>
+          <a:off x="0" y="0"/>
+          <a:ext cx="0" cy="0"/>
+          <a:chOff x="0" y="0"/>
+          <a:chExt cx="0" cy="0"/>
+        </a:xfrm>
+      </p:grpSpPr>
+      <p:pic>
+        <p:nvPicPr>
+          <p:cNvPr id="3076" name="Picture 4" descr="https://m.media-amazon.com/images/I/71GfCJZeDdL._AC_SL1500_.jpg"/>
+          <p:cNvPicPr>
+            <a:picLocks noChangeAspect="1" noChangeArrowheads="1"/>
+          </p:cNvPicPr>
+          <p:nvPr/>
+        </p:nvPicPr>
         <p:blipFill rotWithShape="1">
-          <a:blip r:embed="rId2" cstate="print">
+          <a:blip r:embed="rId2">
+            <a:extLst>
+              <a:ext uri="{28A0092B-C50C-407E-A947-70E740481C1C}">
+                <a14:useLocalDpi xmlns:a14="http://schemas.microsoft.com/office/drawing/2010/main" val="0"/>
+              </a:ext>
+            </a:extLst>
+          </a:blip>
+          <a:srcRect r="55858" b="13025"/>
+          <a:stretch/>
+        </p:blipFill>
+        <p:spPr bwMode="auto">
+          <a:xfrm>
+            <a:off x="4316265" y="342900"/>
+            <a:ext cx="3666653" cy="4572000"/>
+          </a:xfrm>
+          <a:prstGeom prst="rect">
+            <a:avLst/>
+          </a:prstGeom>
+          <a:noFill/>
+          <a:extLst>
+            <a:ext uri="{909E8E84-426E-40DD-AFC4-6F175D3DCCD1}">
+              <a14:hiddenFill xmlns:a14="http://schemas.microsoft.com/office/drawing/2010/main">
+                <a:solidFill>
+                  <a:srgbClr val="FFFFFF"/>
+                </a:solidFill>
+              </a14:hiddenFill>
+            </a:ext>
+          </a:extLst>
+        </p:spPr>
+      </p:pic>
+      <p:sp>
+        <p:nvSpPr>
+          <p:cNvPr id="5" name="TextBox 4"/>
+          <p:cNvSpPr txBox="1"/>
+          <p:nvPr/>
+        </p:nvSpPr>
+        <p:spPr>
+          <a:xfrm>
+            <a:off x="2118546" y="3552353"/>
+            <a:ext cx="2567754" cy="369332"/>
+          </a:xfrm>
+          <a:prstGeom prst="rect">
+            <a:avLst/>
+          </a:prstGeom>
+          <a:noFill/>
+        </p:spPr>
+        <p:txBody>
+          <a:bodyPr wrap="none" rtlCol="0">
+            <a:spAutoFit/>
+          </a:bodyPr>
+          <a:lstStyle/>
+          <a:p>
+            <a:pPr algn="r"/>
+            <a:r>
+              <a:rPr lang="en-US" b="1" dirty="0" smtClean="0">
+                <a:solidFill>
+                  <a:srgbClr val="C00000"/>
+                </a:solidFill>
+                <a:effectLst>
+                  <a:outerShdw blurRad="38100" dist="38100" dir="2700000" algn="tl">
+                    <a:srgbClr val="000000">
+                      <a:alpha val="43137"/>
+                    </a:srgbClr>
+                  </a:outerShdw>
+                </a:effectLst>
+              </a:rPr>
+              <a:t>Regulated 3.3V </a:t>
+            </a:r>
+            <a:r>
+              <a:rPr lang="en-US" b="1" dirty="0" smtClean="0">
+                <a:solidFill>
+                  <a:srgbClr val="C00000"/>
+                </a:solidFill>
+                <a:effectLst>
+                  <a:outerShdw blurRad="38100" dist="38100" dir="2700000" algn="tl">
+                    <a:srgbClr val="000000">
+                      <a:alpha val="43137"/>
+                    </a:srgbClr>
+                  </a:outerShdw>
+                </a:effectLst>
+              </a:rPr>
+              <a:t>Power </a:t>
+            </a:r>
+            <a:r>
+              <a:rPr lang="en-US" b="1" dirty="0" smtClean="0">
+                <a:solidFill>
+                  <a:srgbClr val="C00000"/>
+                </a:solidFill>
+                <a:effectLst>
+                  <a:outerShdw blurRad="38100" dist="38100" dir="2700000" algn="tl">
+                    <a:srgbClr val="000000">
+                      <a:alpha val="43137"/>
+                    </a:srgbClr>
+                  </a:outerShdw>
+                </a:effectLst>
+                <a:sym typeface="Wingdings" pitchFamily="2" charset="2"/>
+              </a:rPr>
+              <a:t></a:t>
+            </a:r>
+            <a:endParaRPr lang="en-US" b="1" dirty="0">
+              <a:solidFill>
+                <a:srgbClr val="C00000"/>
+              </a:solidFill>
+              <a:effectLst>
+                <a:outerShdw blurRad="38100" dist="38100" dir="2700000" algn="tl">
+                  <a:srgbClr val="000000">
+                    <a:alpha val="43137"/>
+                  </a:srgbClr>
+                </a:outerShdw>
+              </a:effectLst>
+            </a:endParaRPr>
+          </a:p>
+        </p:txBody>
+      </p:sp>
+      <p:sp>
+        <p:nvSpPr>
+          <p:cNvPr id="8" name="TextBox 7"/>
+          <p:cNvSpPr txBox="1"/>
+          <p:nvPr/>
+        </p:nvSpPr>
+        <p:spPr>
+          <a:xfrm>
+            <a:off x="2195041" y="1554935"/>
+            <a:ext cx="2491259" cy="369332"/>
+          </a:xfrm>
+          <a:prstGeom prst="rect">
+            <a:avLst/>
+          </a:prstGeom>
+          <a:noFill/>
+        </p:spPr>
+        <p:txBody>
+          <a:bodyPr wrap="none" rtlCol="0">
+            <a:spAutoFit/>
+          </a:bodyPr>
+          <a:lstStyle/>
+          <a:p>
+            <a:pPr algn="r"/>
+            <a:r>
+              <a:rPr lang="en-US" b="1" dirty="0" smtClean="0">
+                <a:solidFill>
+                  <a:schemeClr val="bg1">
+                    <a:lumMod val="65000"/>
+                  </a:schemeClr>
+                </a:solidFill>
+                <a:effectLst>
+                  <a:outerShdw blurRad="38100" dist="38100" dir="2700000" algn="tl">
+                    <a:srgbClr val="000000">
+                      <a:alpha val="43137"/>
+                    </a:srgbClr>
+                  </a:outerShdw>
+                </a:effectLst>
+              </a:rPr>
+              <a:t>Analog Scale Reading </a:t>
+            </a:r>
+            <a:r>
+              <a:rPr lang="en-US" b="1" dirty="0" smtClean="0">
+                <a:solidFill>
+                  <a:schemeClr val="bg1">
+                    <a:lumMod val="65000"/>
+                  </a:schemeClr>
+                </a:solidFill>
+                <a:effectLst>
+                  <a:outerShdw blurRad="38100" dist="38100" dir="2700000" algn="tl">
+                    <a:srgbClr val="000000">
+                      <a:alpha val="43137"/>
+                    </a:srgbClr>
+                  </a:outerShdw>
+                </a:effectLst>
+                <a:sym typeface="Wingdings" pitchFamily="2" charset="2"/>
+              </a:rPr>
+              <a:t></a:t>
+            </a:r>
+            <a:endParaRPr lang="en-US" b="1" dirty="0">
+              <a:solidFill>
+                <a:schemeClr val="bg1">
+                  <a:lumMod val="65000"/>
+                </a:schemeClr>
+              </a:solidFill>
+              <a:effectLst>
+                <a:outerShdw blurRad="38100" dist="38100" dir="2700000" algn="tl">
+                  <a:srgbClr val="000000">
+                    <a:alpha val="43137"/>
+                  </a:srgbClr>
+                </a:outerShdw>
+              </a:effectLst>
+            </a:endParaRPr>
+          </a:p>
+        </p:txBody>
+      </p:sp>
+      <p:sp>
+        <p:nvSpPr>
+          <p:cNvPr id="9" name="TextBox 8"/>
+          <p:cNvSpPr txBox="1"/>
+          <p:nvPr/>
+        </p:nvSpPr>
+        <p:spPr>
+          <a:xfrm>
+            <a:off x="1618281" y="1897835"/>
+            <a:ext cx="3068019" cy="369332"/>
+          </a:xfrm>
+          <a:prstGeom prst="rect">
+            <a:avLst/>
+          </a:prstGeom>
+          <a:noFill/>
+        </p:spPr>
+        <p:txBody>
+          <a:bodyPr wrap="none" rtlCol="0">
+            <a:spAutoFit/>
+          </a:bodyPr>
+          <a:lstStyle/>
+          <a:p>
+            <a:pPr algn="r"/>
+            <a:r>
+              <a:rPr lang="en-US" b="1" dirty="0" smtClean="0">
+                <a:solidFill>
+                  <a:schemeClr val="accent6">
+                    <a:lumMod val="75000"/>
+                  </a:schemeClr>
+                </a:solidFill>
+                <a:effectLst>
+                  <a:outerShdw blurRad="38100" dist="38100" dir="2700000" algn="tl">
+                    <a:srgbClr val="000000">
+                      <a:alpha val="43137"/>
+                    </a:srgbClr>
+                  </a:outerShdw>
+                </a:effectLst>
+              </a:rPr>
+              <a:t>Jump to RST for sleep wake </a:t>
+            </a:r>
+            <a:r>
+              <a:rPr lang="en-US" b="1" dirty="0" smtClean="0">
+                <a:solidFill>
+                  <a:schemeClr val="accent6">
+                    <a:lumMod val="75000"/>
+                  </a:schemeClr>
+                </a:solidFill>
+                <a:effectLst>
+                  <a:outerShdw blurRad="38100" dist="38100" dir="2700000" algn="tl">
+                    <a:srgbClr val="000000">
+                      <a:alpha val="43137"/>
+                    </a:srgbClr>
+                  </a:outerShdw>
+                </a:effectLst>
+                <a:sym typeface="Wingdings" pitchFamily="2" charset="2"/>
+              </a:rPr>
+              <a:t></a:t>
+            </a:r>
+            <a:endParaRPr lang="en-US" b="1" dirty="0">
+              <a:solidFill>
+                <a:schemeClr val="accent6">
+                  <a:lumMod val="75000"/>
+                </a:schemeClr>
+              </a:solidFill>
+              <a:effectLst>
+                <a:outerShdw blurRad="38100" dist="38100" dir="2700000" algn="tl">
+                  <a:srgbClr val="000000">
+                    <a:alpha val="43137"/>
+                  </a:srgbClr>
+                </a:outerShdw>
+              </a:effectLst>
+            </a:endParaRPr>
+          </a:p>
+        </p:txBody>
+      </p:sp>
+      <p:sp>
+        <p:nvSpPr>
+          <p:cNvPr id="10" name="TextBox 9"/>
+          <p:cNvSpPr txBox="1"/>
+          <p:nvPr/>
+        </p:nvSpPr>
+        <p:spPr>
+          <a:xfrm>
+            <a:off x="1703304" y="1224477"/>
+            <a:ext cx="2982996" cy="369332"/>
+          </a:xfrm>
+          <a:prstGeom prst="rect">
+            <a:avLst/>
+          </a:prstGeom>
+          <a:noFill/>
+        </p:spPr>
+        <p:txBody>
+          <a:bodyPr wrap="none" rtlCol="0">
+            <a:spAutoFit/>
+          </a:bodyPr>
+          <a:lstStyle/>
+          <a:p>
+            <a:pPr algn="r"/>
+            <a:r>
+              <a:rPr lang="en-US" b="1" dirty="0" smtClean="0">
+                <a:solidFill>
+                  <a:schemeClr val="accent6">
+                    <a:lumMod val="75000"/>
+                  </a:schemeClr>
+                </a:solidFill>
+                <a:effectLst>
+                  <a:outerShdw blurRad="38100" dist="38100" dir="2700000" algn="tl">
+                    <a:srgbClr val="000000">
+                      <a:alpha val="43137"/>
+                    </a:srgbClr>
+                  </a:outerShdw>
+                </a:effectLst>
+              </a:rPr>
+              <a:t>Jump to D0 for sleep wake </a:t>
+            </a:r>
+            <a:r>
+              <a:rPr lang="en-US" b="1" dirty="0" smtClean="0">
+                <a:solidFill>
+                  <a:schemeClr val="accent6">
+                    <a:lumMod val="75000"/>
+                  </a:schemeClr>
+                </a:solidFill>
+                <a:effectLst>
+                  <a:outerShdw blurRad="38100" dist="38100" dir="2700000" algn="tl">
+                    <a:srgbClr val="000000">
+                      <a:alpha val="43137"/>
+                    </a:srgbClr>
+                  </a:outerShdw>
+                </a:effectLst>
+                <a:sym typeface="Wingdings" pitchFamily="2" charset="2"/>
+              </a:rPr>
+              <a:t></a:t>
+            </a:r>
+            <a:endParaRPr lang="en-US" b="1" dirty="0">
+              <a:solidFill>
+                <a:schemeClr val="accent6">
+                  <a:lumMod val="75000"/>
+                </a:schemeClr>
+              </a:solidFill>
+              <a:effectLst>
+                <a:outerShdw blurRad="38100" dist="38100" dir="2700000" algn="tl">
+                  <a:srgbClr val="000000">
+                    <a:alpha val="43137"/>
+                  </a:srgbClr>
+                </a:outerShdw>
+              </a:effectLst>
+            </a:endParaRPr>
+          </a:p>
+        </p:txBody>
+      </p:sp>
+      <p:sp>
+        <p:nvSpPr>
+          <p:cNvPr id="11" name="TextBox 10"/>
+          <p:cNvSpPr txBox="1"/>
+          <p:nvPr/>
+        </p:nvSpPr>
+        <p:spPr>
+          <a:xfrm>
+            <a:off x="2950568" y="2222629"/>
+            <a:ext cx="1735732" cy="369332"/>
+          </a:xfrm>
+          <a:prstGeom prst="rect">
+            <a:avLst/>
+          </a:prstGeom>
+          <a:noFill/>
+        </p:spPr>
+        <p:txBody>
+          <a:bodyPr wrap="none" rtlCol="0">
+            <a:spAutoFit/>
+          </a:bodyPr>
+          <a:lstStyle/>
+          <a:p>
+            <a:pPr algn="r"/>
+            <a:r>
+              <a:rPr lang="en-US" b="1" dirty="0" smtClean="0">
+                <a:solidFill>
+                  <a:srgbClr val="CCCC00"/>
+                </a:solidFill>
+                <a:effectLst>
+                  <a:outerShdw blurRad="38100" dist="38100" dir="2700000" algn="tl">
+                    <a:srgbClr val="000000">
+                      <a:alpha val="43137"/>
+                    </a:srgbClr>
+                  </a:outerShdw>
+                </a:effectLst>
+              </a:rPr>
+              <a:t>To Status LED </a:t>
+            </a:r>
+            <a:r>
+              <a:rPr lang="en-US" b="1" dirty="0" smtClean="0">
+                <a:solidFill>
+                  <a:srgbClr val="CCCC00"/>
+                </a:solidFill>
+                <a:effectLst>
+                  <a:outerShdw blurRad="38100" dist="38100" dir="2700000" algn="tl">
+                    <a:srgbClr val="000000">
+                      <a:alpha val="43137"/>
+                    </a:srgbClr>
+                  </a:outerShdw>
+                </a:effectLst>
+                <a:sym typeface="Wingdings" pitchFamily="2" charset="2"/>
+              </a:rPr>
+              <a:t></a:t>
+            </a:r>
+            <a:endParaRPr lang="en-US" b="1" dirty="0">
+              <a:solidFill>
+                <a:srgbClr val="CCCC00"/>
+              </a:solidFill>
+              <a:effectLst>
+                <a:outerShdw blurRad="38100" dist="38100" dir="2700000" algn="tl">
+                  <a:srgbClr val="000000">
+                    <a:alpha val="43137"/>
+                  </a:srgbClr>
+                </a:outerShdw>
+              </a:effectLst>
+            </a:endParaRPr>
+          </a:p>
+        </p:txBody>
+      </p:sp>
+      <p:sp>
+        <p:nvSpPr>
+          <p:cNvPr id="12" name="TextBox 11"/>
+          <p:cNvSpPr txBox="1"/>
+          <p:nvPr/>
+        </p:nvSpPr>
+        <p:spPr>
+          <a:xfrm>
+            <a:off x="1222980" y="2565529"/>
+            <a:ext cx="3463320" cy="369332"/>
+          </a:xfrm>
+          <a:prstGeom prst="rect">
+            <a:avLst/>
+          </a:prstGeom>
+          <a:noFill/>
+        </p:spPr>
+        <p:txBody>
+          <a:bodyPr wrap="none" rtlCol="0">
+            <a:spAutoFit/>
+          </a:bodyPr>
+          <a:lstStyle/>
+          <a:p>
+            <a:pPr algn="r"/>
+            <a:r>
+              <a:rPr lang="en-US" b="1" dirty="0" smtClean="0">
+                <a:solidFill>
+                  <a:srgbClr val="008000"/>
+                </a:solidFill>
+                <a:effectLst>
+                  <a:outerShdw blurRad="38100" dist="38100" dir="2700000" algn="tl">
+                    <a:srgbClr val="000000">
+                      <a:alpha val="43137"/>
+                    </a:srgbClr>
+                  </a:outerShdw>
+                </a:effectLst>
+                <a:sym typeface="Wingdings" pitchFamily="2" charset="2"/>
+              </a:rPr>
+              <a:t>Switched Power Out To </a:t>
+            </a:r>
+            <a:r>
+              <a:rPr lang="en-US" b="1" dirty="0" smtClean="0">
+                <a:solidFill>
+                  <a:srgbClr val="008000"/>
+                </a:solidFill>
+                <a:effectLst>
+                  <a:outerShdw blurRad="38100" dist="38100" dir="2700000" algn="tl">
+                    <a:srgbClr val="000000">
+                      <a:alpha val="43137"/>
+                    </a:srgbClr>
+                  </a:outerShdw>
+                </a:effectLst>
+                <a:sym typeface="Wingdings" pitchFamily="2" charset="2"/>
+              </a:rPr>
+              <a:t>Sensors </a:t>
+            </a:r>
+            <a:endParaRPr lang="en-US" b="1" dirty="0">
+              <a:solidFill>
+                <a:srgbClr val="008000"/>
+              </a:solidFill>
+              <a:effectLst>
+                <a:outerShdw blurRad="38100" dist="38100" dir="2700000" algn="tl">
+                  <a:srgbClr val="000000">
+                    <a:alpha val="43137"/>
+                  </a:srgbClr>
+                </a:outerShdw>
+              </a:effectLst>
+            </a:endParaRPr>
+          </a:p>
+        </p:txBody>
+      </p:sp>
+      <p:sp>
+        <p:nvSpPr>
+          <p:cNvPr id="15" name="TextBox 14"/>
+          <p:cNvSpPr txBox="1"/>
+          <p:nvPr/>
+        </p:nvSpPr>
+        <p:spPr>
+          <a:xfrm>
+            <a:off x="1986907" y="2884659"/>
+            <a:ext cx="2699393" cy="369332"/>
+          </a:xfrm>
+          <a:prstGeom prst="rect">
+            <a:avLst/>
+          </a:prstGeom>
+          <a:noFill/>
+        </p:spPr>
+        <p:txBody>
+          <a:bodyPr wrap="none" rtlCol="0">
+            <a:spAutoFit/>
+          </a:bodyPr>
+          <a:lstStyle/>
+          <a:p>
+            <a:pPr algn="r"/>
+            <a:r>
+              <a:rPr lang="en-US" b="1" dirty="0" smtClean="0">
+                <a:solidFill>
+                  <a:srgbClr val="0070C0"/>
+                </a:solidFill>
+                <a:effectLst>
+                  <a:outerShdw blurRad="38100" dist="38100" dir="2700000" algn="tl">
+                    <a:srgbClr val="000000">
+                      <a:alpha val="43137"/>
+                    </a:srgbClr>
+                  </a:outerShdw>
+                </a:effectLst>
+                <a:sym typeface="Wingdings" pitchFamily="2" charset="2"/>
+              </a:rPr>
+              <a:t>Data from Temp Sensor </a:t>
+            </a:r>
+            <a:endParaRPr lang="en-US" b="1" dirty="0">
+              <a:solidFill>
+                <a:srgbClr val="0070C0"/>
+              </a:solidFill>
+              <a:effectLst>
+                <a:outerShdw blurRad="38100" dist="38100" dir="2700000" algn="tl">
+                  <a:srgbClr val="000000">
+                    <a:alpha val="43137"/>
+                  </a:srgbClr>
+                </a:outerShdw>
+              </a:effectLst>
+            </a:endParaRPr>
+          </a:p>
+        </p:txBody>
+      </p:sp>
+      <p:sp>
+        <p:nvSpPr>
+          <p:cNvPr id="16" name="TextBox 15"/>
+          <p:cNvSpPr txBox="1"/>
+          <p:nvPr/>
+        </p:nvSpPr>
+        <p:spPr>
+          <a:xfrm>
+            <a:off x="7772400" y="3200400"/>
+            <a:ext cx="1342868" cy="369332"/>
+          </a:xfrm>
+          <a:prstGeom prst="rect">
+            <a:avLst/>
+          </a:prstGeom>
+          <a:noFill/>
+        </p:spPr>
+        <p:txBody>
+          <a:bodyPr wrap="none" rtlCol="0">
+            <a:spAutoFit/>
+          </a:bodyPr>
+          <a:lstStyle/>
+          <a:p>
+            <a:r>
+              <a:rPr lang="en-US" b="1" dirty="0" smtClean="0">
+                <a:effectLst>
+                  <a:outerShdw blurRad="38100" dist="38100" dir="2700000" algn="tl">
+                    <a:srgbClr val="000000">
+                      <a:alpha val="43137"/>
+                    </a:srgbClr>
+                  </a:outerShdw>
+                </a:effectLst>
+                <a:sym typeface="Wingdings" pitchFamily="2" charset="2"/>
+              </a:rPr>
+              <a:t> </a:t>
+            </a:r>
+            <a:r>
+              <a:rPr lang="en-US" b="1" dirty="0" smtClean="0">
+                <a:effectLst>
+                  <a:outerShdw blurRad="38100" dist="38100" dir="2700000" algn="tl">
+                    <a:srgbClr val="000000">
+                      <a:alpha val="43137"/>
+                    </a:srgbClr>
+                  </a:outerShdw>
+                </a:effectLst>
+              </a:rPr>
+              <a:t>GROUND</a:t>
+            </a:r>
+            <a:endParaRPr lang="en-US" b="1" dirty="0">
+              <a:effectLst>
+                <a:outerShdw blurRad="38100" dist="38100" dir="2700000" algn="tl">
+                  <a:srgbClr val="000000">
+                    <a:alpha val="43137"/>
+                  </a:srgbClr>
+                </a:outerShdw>
+              </a:effectLst>
+            </a:endParaRPr>
+          </a:p>
+        </p:txBody>
+      </p:sp>
+      <p:sp>
+        <p:nvSpPr>
+          <p:cNvPr id="17" name="TextBox 16"/>
+          <p:cNvSpPr txBox="1"/>
+          <p:nvPr/>
+        </p:nvSpPr>
+        <p:spPr>
+          <a:xfrm>
+            <a:off x="5029200" y="4745480"/>
+            <a:ext cx="2326213" cy="512320"/>
+          </a:xfrm>
+          <a:prstGeom prst="rect">
+            <a:avLst/>
+          </a:prstGeom>
+          <a:noFill/>
+        </p:spPr>
+        <p:txBody>
+          <a:bodyPr wrap="none" rtlCol="0">
+            <a:spAutoFit/>
+          </a:bodyPr>
+          <a:lstStyle/>
+          <a:p>
+            <a:pPr algn="ctr">
+              <a:lnSpc>
+                <a:spcPts val="1600"/>
+              </a:lnSpc>
+            </a:pPr>
+            <a:r>
+              <a:rPr lang="en-US" b="1" dirty="0" smtClean="0">
+                <a:effectLst>
+                  <a:outerShdw blurRad="38100" dist="38100" dir="2700000" algn="tl">
+                    <a:srgbClr val="000000">
+                      <a:alpha val="43137"/>
+                    </a:srgbClr>
+                  </a:outerShdw>
+                </a:effectLst>
+                <a:sym typeface="Wingdings" pitchFamily="2" charset="2"/>
+              </a:rPr>
+              <a:t>USB</a:t>
+            </a:r>
+          </a:p>
+          <a:p>
+            <a:pPr algn="ctr">
+              <a:lnSpc>
+                <a:spcPts val="1600"/>
+              </a:lnSpc>
+            </a:pPr>
+            <a:r>
+              <a:rPr lang="en-US" b="1" dirty="0" smtClean="0">
+                <a:effectLst>
+                  <a:outerShdw blurRad="38100" dist="38100" dir="2700000" algn="tl">
+                    <a:srgbClr val="000000">
+                      <a:alpha val="43137"/>
+                    </a:srgbClr>
+                  </a:outerShdw>
+                </a:effectLst>
+                <a:sym typeface="Wingdings" pitchFamily="2" charset="2"/>
+              </a:rPr>
+              <a:t>(Power/Programming)</a:t>
+            </a:r>
+            <a:endParaRPr lang="en-US" b="1" dirty="0">
+              <a:effectLst>
+                <a:outerShdw blurRad="38100" dist="38100" dir="2700000" algn="tl">
+                  <a:srgbClr val="000000">
+                    <a:alpha val="43137"/>
+                  </a:srgbClr>
+                </a:outerShdw>
+              </a:effectLst>
+            </a:endParaRPr>
+          </a:p>
+        </p:txBody>
+      </p:sp>
+      <p:pic>
+        <p:nvPicPr>
+          <p:cNvPr id="1026" name="Picture 2" descr="5pcs DALLAS DS18B20 18B20 TO-92 IC Thermometer Temperature Sensor DS18B20  - Picture 1 of 2"/>
+          <p:cNvPicPr>
+            <a:picLocks noChangeAspect="1" noChangeArrowheads="1"/>
+          </p:cNvPicPr>
+          <p:nvPr/>
+        </p:nvPicPr>
+        <p:blipFill rotWithShape="1">
+          <a:blip r:embed="rId3">
+            <a:extLst>
+              <a:ext uri="{28A0092B-C50C-407E-A947-70E740481C1C}">
+                <a14:useLocalDpi xmlns:a14="http://schemas.microsoft.com/office/drawing/2010/main" val="0"/>
+              </a:ext>
+            </a:extLst>
+          </a:blip>
+          <a:srcRect l="29370" t="1" r="5616" b="19652"/>
+          <a:stretch/>
+        </p:blipFill>
+        <p:spPr bwMode="auto">
+          <a:xfrm rot="5400000">
+            <a:off x="1827307" y="4360885"/>
+            <a:ext cx="2258812" cy="2506818"/>
+          </a:xfrm>
+          <a:prstGeom prst="rect">
+            <a:avLst/>
+          </a:prstGeom>
+          <a:noFill/>
+          <a:extLst>
+            <a:ext uri="{909E8E84-426E-40DD-AFC4-6F175D3DCCD1}">
+              <a14:hiddenFill xmlns:a14="http://schemas.microsoft.com/office/drawing/2010/main">
+                <a:solidFill>
+                  <a:srgbClr val="FFFFFF"/>
+                </a:solidFill>
+              </a14:hiddenFill>
+            </a:ext>
+          </a:extLst>
+        </p:spPr>
+      </p:pic>
+      <p:sp>
+        <p:nvSpPr>
+          <p:cNvPr id="19" name="TextBox 18"/>
+          <p:cNvSpPr txBox="1"/>
+          <p:nvPr/>
+        </p:nvSpPr>
+        <p:spPr>
+          <a:xfrm>
+            <a:off x="984326" y="5600700"/>
+            <a:ext cx="615874" cy="369332"/>
+          </a:xfrm>
+          <a:prstGeom prst="rect">
+            <a:avLst/>
+          </a:prstGeom>
+          <a:noFill/>
+        </p:spPr>
+        <p:txBody>
+          <a:bodyPr wrap="none" rtlCol="0">
+            <a:spAutoFit/>
+          </a:bodyPr>
+          <a:lstStyle/>
+          <a:p>
+            <a:pPr algn="r"/>
+            <a:r>
+              <a:rPr lang="en-US" b="1" dirty="0" smtClean="0">
+                <a:solidFill>
+                  <a:srgbClr val="008000"/>
+                </a:solidFill>
+                <a:effectLst>
+                  <a:outerShdw blurRad="38100" dist="38100" dir="2700000" algn="tl">
+                    <a:srgbClr val="000000">
+                      <a:alpha val="43137"/>
+                    </a:srgbClr>
+                  </a:outerShdw>
+                </a:effectLst>
+                <a:sym typeface="Wingdings" pitchFamily="2" charset="2"/>
+              </a:rPr>
+              <a:t>3.3V</a:t>
+            </a:r>
+            <a:endParaRPr lang="en-US" b="1" dirty="0">
+              <a:solidFill>
+                <a:srgbClr val="008000"/>
+              </a:solidFill>
+              <a:effectLst>
+                <a:outerShdw blurRad="38100" dist="38100" dir="2700000" algn="tl">
+                  <a:srgbClr val="000000">
+                    <a:alpha val="43137"/>
+                  </a:srgbClr>
+                </a:outerShdw>
+              </a:effectLst>
+            </a:endParaRPr>
+          </a:p>
+        </p:txBody>
+      </p:sp>
+      <p:cxnSp>
+        <p:nvCxnSpPr>
+          <p:cNvPr id="20" name="Straight Connector 19"/>
+          <p:cNvCxnSpPr/>
+          <p:nvPr/>
+        </p:nvCxnSpPr>
+        <p:spPr>
+          <a:xfrm flipH="1">
+            <a:off x="228600" y="3086100"/>
+            <a:ext cx="1828800" cy="0"/>
+          </a:xfrm>
+          <a:prstGeom prst="line">
+            <a:avLst/>
+          </a:prstGeom>
+          <a:ln w="38100">
+            <a:solidFill>
+              <a:schemeClr val="accent1"/>
+            </a:solidFill>
+            <a:headEnd type="none" w="med" len="med"/>
+            <a:tailEnd type="none" w="med" len="med"/>
+          </a:ln>
+        </p:spPr>
+        <p:style>
+          <a:lnRef idx="1">
+            <a:schemeClr val="accent1"/>
+          </a:lnRef>
+          <a:fillRef idx="0">
+            <a:schemeClr val="accent1"/>
+          </a:fillRef>
+          <a:effectRef idx="0">
+            <a:schemeClr val="accent1"/>
+          </a:effectRef>
+          <a:fontRef idx="minor">
+            <a:schemeClr val="tx1"/>
+          </a:fontRef>
+        </p:style>
+      </p:cxnSp>
+      <p:sp>
+        <p:nvSpPr>
+          <p:cNvPr id="21" name="TextBox 20"/>
+          <p:cNvSpPr txBox="1"/>
+          <p:nvPr/>
+        </p:nvSpPr>
+        <p:spPr>
+          <a:xfrm>
+            <a:off x="914400" y="4202668"/>
+            <a:ext cx="630301" cy="369332"/>
+          </a:xfrm>
+          <a:prstGeom prst="rect">
+            <a:avLst/>
+          </a:prstGeom>
+          <a:noFill/>
+        </p:spPr>
+        <p:txBody>
+          <a:bodyPr wrap="none" rtlCol="0">
+            <a:spAutoFit/>
+          </a:bodyPr>
+          <a:lstStyle/>
+          <a:p>
+            <a:pPr algn="r"/>
+            <a:r>
+              <a:rPr lang="en-US" b="1" dirty="0" smtClean="0">
+                <a:effectLst>
+                  <a:outerShdw blurRad="38100" dist="38100" dir="2700000" algn="tl">
+                    <a:srgbClr val="000000">
+                      <a:alpha val="43137"/>
+                    </a:srgbClr>
+                  </a:outerShdw>
+                </a:effectLst>
+                <a:sym typeface="Wingdings" pitchFamily="2" charset="2"/>
+              </a:rPr>
+              <a:t>GND</a:t>
+            </a:r>
+            <a:endParaRPr lang="en-US" b="1" dirty="0">
+              <a:effectLst>
+                <a:outerShdw blurRad="38100" dist="38100" dir="2700000" algn="tl">
+                  <a:srgbClr val="000000">
+                    <a:alpha val="43137"/>
+                  </a:srgbClr>
+                </a:outerShdw>
+              </a:effectLst>
+            </a:endParaRPr>
+          </a:p>
+        </p:txBody>
+      </p:sp>
+      <p:sp>
+        <p:nvSpPr>
+          <p:cNvPr id="22" name="TextBox 21"/>
+          <p:cNvSpPr txBox="1"/>
+          <p:nvPr/>
+        </p:nvSpPr>
+        <p:spPr>
+          <a:xfrm>
+            <a:off x="342900" y="4545568"/>
+            <a:ext cx="633700" cy="369332"/>
+          </a:xfrm>
+          <a:prstGeom prst="rect">
+            <a:avLst/>
+          </a:prstGeom>
+          <a:noFill/>
+        </p:spPr>
+        <p:txBody>
+          <a:bodyPr wrap="none" rtlCol="0">
+            <a:spAutoFit/>
+          </a:bodyPr>
+          <a:lstStyle/>
+          <a:p>
+            <a:pPr algn="r"/>
+            <a:r>
+              <a:rPr lang="en-US" b="1" dirty="0" smtClean="0">
+                <a:solidFill>
+                  <a:srgbClr val="0070C0"/>
+                </a:solidFill>
+                <a:effectLst>
+                  <a:outerShdw blurRad="38100" dist="38100" dir="2700000" algn="tl">
+                    <a:srgbClr val="000000">
+                      <a:alpha val="43137"/>
+                    </a:srgbClr>
+                  </a:outerShdw>
+                </a:effectLst>
+                <a:sym typeface="Wingdings" pitchFamily="2" charset="2"/>
+              </a:rPr>
+              <a:t>Data</a:t>
+            </a:r>
+            <a:endParaRPr lang="en-US" b="1" dirty="0">
+              <a:solidFill>
+                <a:srgbClr val="0070C0"/>
+              </a:solidFill>
+              <a:effectLst>
+                <a:outerShdw blurRad="38100" dist="38100" dir="2700000" algn="tl">
+                  <a:srgbClr val="000000">
+                    <a:alpha val="43137"/>
+                  </a:srgbClr>
+                </a:outerShdw>
+              </a:effectLst>
+            </a:endParaRPr>
+          </a:p>
+        </p:txBody>
+      </p:sp>
+      <p:cxnSp>
+        <p:nvCxnSpPr>
+          <p:cNvPr id="26" name="Straight Connector 25"/>
+          <p:cNvCxnSpPr/>
+          <p:nvPr/>
+        </p:nvCxnSpPr>
+        <p:spPr>
+          <a:xfrm flipV="1">
+            <a:off x="228600" y="3086100"/>
+            <a:ext cx="0" cy="1920876"/>
+          </a:xfrm>
+          <a:prstGeom prst="line">
+            <a:avLst/>
+          </a:prstGeom>
+          <a:ln w="38100">
+            <a:solidFill>
+              <a:schemeClr val="accent1"/>
+            </a:solidFill>
+            <a:headEnd type="none" w="med" len="med"/>
+            <a:tailEnd type="none" w="med" len="med"/>
+          </a:ln>
+        </p:spPr>
+        <p:style>
+          <a:lnRef idx="1">
+            <a:schemeClr val="accent1"/>
+          </a:lnRef>
+          <a:fillRef idx="0">
+            <a:schemeClr val="accent1"/>
+          </a:fillRef>
+          <a:effectRef idx="0">
+            <a:schemeClr val="accent1"/>
+          </a:effectRef>
+          <a:fontRef idx="minor">
+            <a:schemeClr val="tx1"/>
+          </a:fontRef>
+        </p:style>
+      </p:cxnSp>
+      <p:cxnSp>
+        <p:nvCxnSpPr>
+          <p:cNvPr id="31" name="Straight Connector 30"/>
+          <p:cNvCxnSpPr/>
+          <p:nvPr/>
+        </p:nvCxnSpPr>
+        <p:spPr>
+          <a:xfrm flipH="1">
+            <a:off x="228600" y="4841385"/>
+            <a:ext cx="1474704" cy="0"/>
+          </a:xfrm>
+          <a:prstGeom prst="line">
+            <a:avLst/>
+          </a:prstGeom>
+          <a:ln w="38100">
+            <a:solidFill>
+              <a:schemeClr val="accent1"/>
+            </a:solidFill>
+            <a:headEnd type="none" w="med" len="med"/>
+            <a:tailEnd type="none" w="med" len="med"/>
+          </a:ln>
+        </p:spPr>
+        <p:style>
+          <a:lnRef idx="1">
+            <a:schemeClr val="accent1"/>
+          </a:lnRef>
+          <a:fillRef idx="0">
+            <a:schemeClr val="accent1"/>
+          </a:fillRef>
+          <a:effectRef idx="0">
+            <a:schemeClr val="accent1"/>
+          </a:effectRef>
+          <a:fontRef idx="minor">
+            <a:schemeClr val="tx1"/>
+          </a:fontRef>
+        </p:style>
+      </p:cxnSp>
+      <p:pic>
+        <p:nvPicPr>
+          <p:cNvPr id="1028" name="Picture 4" descr="Resistor Schematic Symbol with White Background - Wisc ..."/>
+          <p:cNvPicPr>
+            <a:picLocks noChangeAspect="1" noChangeArrowheads="1"/>
+          </p:cNvPicPr>
+          <p:nvPr/>
+        </p:nvPicPr>
+        <p:blipFill rotWithShape="1">
+          <a:blip r:embed="rId4" cstate="print">
             <a:clrChange>
               <a:clrFrom>
-                <a:srgbClr val="FFFF00"/>
+                <a:srgbClr val="FFFFFF"/>
               </a:clrFrom>
               <a:clrTo>
-                <a:srgbClr val="FFFF00">
+                <a:srgbClr val="FFFFFF">
                   <a:alpha val="0"/>
                 </a:srgbClr>
               </a:clrTo>
@@ -4380,13 +7274,13 @@
               </a:ext>
             </a:extLst>
           </a:blip>
-          <a:srcRect t="14520"/>
+          <a:srcRect l="28616" t="36475" r="26000" b="35524"/>
           <a:stretch/>
         </p:blipFill>
         <p:spPr bwMode="auto">
           <a:xfrm>
-            <a:off x="0" y="1488819"/>
-            <a:ext cx="9144000" cy="3870581"/>
+            <a:off x="228600" y="4940300"/>
+            <a:ext cx="562707" cy="150334"/>
           </a:xfrm>
           <a:prstGeom prst="rect">
             <a:avLst/>
@@ -4403,25 +7297,70 @@
           </a:extLst>
         </p:spPr>
       </p:pic>
+      <p:sp>
+        <p:nvSpPr>
+          <p:cNvPr id="1027" name="TextBox 1026"/>
+          <p:cNvSpPr txBox="1"/>
+          <p:nvPr/>
+        </p:nvSpPr>
+        <p:spPr>
+          <a:xfrm>
+            <a:off x="41365" y="5029200"/>
+            <a:ext cx="888385" cy="923330"/>
+          </a:xfrm>
+          <a:prstGeom prst="rect">
+            <a:avLst/>
+          </a:prstGeom>
+          <a:noFill/>
+        </p:spPr>
+        <p:txBody>
+          <a:bodyPr wrap="none" rtlCol="0">
+            <a:spAutoFit/>
+          </a:bodyPr>
+          <a:lstStyle/>
+          <a:p>
+            <a:pPr algn="ctr"/>
+            <a:r>
+              <a:rPr lang="en-US" b="1" dirty="0" smtClean="0"/>
+              <a:t>4.7K</a:t>
+            </a:r>
+          </a:p>
+          <a:p>
+            <a:pPr algn="ctr"/>
+            <a:r>
+              <a:rPr lang="en-US" b="1" dirty="0" smtClean="0"/>
+              <a:t>Ohms</a:t>
+            </a:r>
+          </a:p>
+          <a:p>
+            <a:pPr algn="ctr"/>
+            <a:r>
+              <a:rPr lang="en-US" dirty="0" smtClean="0"/>
+              <a:t>Pull-Up</a:t>
+            </a:r>
+          </a:p>
+        </p:txBody>
+      </p:sp>
       <p:cxnSp>
         <p:nvCxnSpPr>
-          <p:cNvPr id="8" name="Straight Arrow Connector 7"/>
+          <p:cNvPr id="38" name="Straight Connector 37"/>
           <p:cNvCxnSpPr/>
           <p:nvPr/>
         </p:nvCxnSpPr>
         <p:spPr>
-          <a:xfrm flipV="1">
-            <a:off x="2057400" y="4375150"/>
-            <a:ext cx="742950" cy="1339850"/>
-          </a:xfrm>
-          <a:prstGeom prst="straightConnector1">
+          <a:xfrm flipH="1">
+            <a:off x="755651" y="5010150"/>
+            <a:ext cx="958849" cy="0"/>
+          </a:xfrm>
+          <a:prstGeom prst="line">
             <a:avLst/>
           </a:prstGeom>
           <a:ln w="38100">
             <a:solidFill>
-              <a:srgbClr val="FF0000"/>
+              <a:srgbClr val="008000"/>
             </a:solidFill>
-            <a:tailEnd type="arrow"/>
+            <a:headEnd type="none" w="med" len="med"/>
+            <a:tailEnd type="none" w="med" len="med"/>
           </a:ln>
         </p:spPr>
         <p:style>
@@ -4441,23 +7380,24 @@
       </p:cxnSp>
       <p:cxnSp>
         <p:nvCxnSpPr>
-          <p:cNvPr id="16" name="Straight Arrow Connector 15"/>
+          <p:cNvPr id="41" name="Straight Connector 40"/>
           <p:cNvCxnSpPr/>
           <p:nvPr/>
         </p:nvCxnSpPr>
         <p:spPr>
-          <a:xfrm flipH="1" flipV="1">
-            <a:off x="2800350" y="3705226"/>
-            <a:ext cx="514350" cy="2009774"/>
-          </a:xfrm>
-          <a:prstGeom prst="straightConnector1">
+          <a:xfrm flipV="1">
+            <a:off x="1257299" y="5029200"/>
+            <a:ext cx="1" cy="685800"/>
+          </a:xfrm>
+          <a:prstGeom prst="line">
             <a:avLst/>
           </a:prstGeom>
           <a:ln w="38100">
             <a:solidFill>
-              <a:schemeClr val="tx1"/>
+              <a:srgbClr val="008000"/>
             </a:solidFill>
-            <a:tailEnd type="arrow"/>
+            <a:headEnd type="none" w="med" len="med"/>
+            <a:tailEnd type="none" w="med" len="med"/>
           </a:ln>
         </p:spPr>
         <p:style>
@@ -4477,23 +7417,24 @@
       </p:cxnSp>
       <p:cxnSp>
         <p:nvCxnSpPr>
-          <p:cNvPr id="19" name="Straight Arrow Connector 18"/>
+          <p:cNvPr id="47" name="Straight Connector 46"/>
           <p:cNvCxnSpPr/>
           <p:nvPr/>
         </p:nvCxnSpPr>
         <p:spPr>
-          <a:xfrm>
-            <a:off x="2286000" y="1626632"/>
-            <a:ext cx="1128713" cy="1295162"/>
-          </a:xfrm>
-          <a:prstGeom prst="straightConnector1">
+          <a:xfrm flipH="1">
+            <a:off x="1235075" y="4673600"/>
+            <a:ext cx="479426" cy="0"/>
+          </a:xfrm>
+          <a:prstGeom prst="line">
             <a:avLst/>
           </a:prstGeom>
           <a:ln w="38100">
             <a:solidFill>
-              <a:srgbClr val="FFFF00"/>
+              <a:schemeClr val="tx1"/>
             </a:solidFill>
-            <a:tailEnd type="arrow"/>
+            <a:headEnd type="none" w="med" len="med"/>
+            <a:tailEnd type="none" w="med" len="med"/>
           </a:ln>
         </p:spPr>
         <p:style>
@@ -4511,151 +7452,26 @@
           </a:fontRef>
         </p:style>
       </p:cxnSp>
-      <p:sp>
-        <p:nvSpPr>
-          <p:cNvPr id="15" name="TextBox 14"/>
-          <p:cNvSpPr txBox="1"/>
-          <p:nvPr/>
-        </p:nvSpPr>
-        <p:spPr>
-          <a:xfrm>
-            <a:off x="1943100" y="1257300"/>
-            <a:ext cx="1486304" cy="369332"/>
-          </a:xfrm>
-          <a:prstGeom prst="rect">
-            <a:avLst/>
-          </a:prstGeom>
-          <a:noFill/>
-        </p:spPr>
-        <p:txBody>
-          <a:bodyPr wrap="none" rtlCol="0">
-            <a:spAutoFit/>
-          </a:bodyPr>
-          <a:lstStyle/>
-          <a:p>
-            <a:r>
-              <a:rPr lang="en-US" dirty="0" smtClean="0"/>
-              <a:t>LED (3.3v=on)</a:t>
-            </a:r>
-            <a:endParaRPr lang="en-US" dirty="0"/>
-          </a:p>
-        </p:txBody>
-      </p:sp>
-      <p:sp>
-        <p:nvSpPr>
-          <p:cNvPr id="20" name="Oval 19"/>
-          <p:cNvSpPr/>
-          <p:nvPr/>
-        </p:nvSpPr>
-        <p:spPr>
-          <a:xfrm>
-            <a:off x="3417085" y="2855124"/>
-            <a:ext cx="114704" cy="114704"/>
-          </a:xfrm>
-          <a:prstGeom prst="ellipse">
-            <a:avLst/>
-          </a:prstGeom>
-          <a:noFill/>
-          <a:ln>
-            <a:solidFill>
-              <a:srgbClr val="FFFF00"/>
-            </a:solidFill>
-          </a:ln>
-        </p:spPr>
-        <p:style>
-          <a:lnRef idx="2">
-            <a:schemeClr val="accent1">
-              <a:shade val="50000"/>
-            </a:schemeClr>
-          </a:lnRef>
-          <a:fillRef idx="1">
-            <a:schemeClr val="accent1"/>
-          </a:fillRef>
-          <a:effectRef idx="0">
-            <a:schemeClr val="accent1"/>
-          </a:effectRef>
-          <a:fontRef idx="minor">
-            <a:schemeClr val="lt1"/>
-          </a:fontRef>
-        </p:style>
-        <p:txBody>
-          <a:bodyPr rtlCol="0" anchor="ctr"/>
-          <a:lstStyle/>
-          <a:p>
-            <a:pPr algn="ctr"/>
-            <a:endParaRPr lang="en-US"/>
-          </a:p>
-        </p:txBody>
-      </p:sp>
-      <p:sp>
-        <p:nvSpPr>
-          <p:cNvPr id="25" name="Oval 24"/>
-          <p:cNvSpPr/>
-          <p:nvPr/>
-        </p:nvSpPr>
-        <p:spPr>
-          <a:xfrm>
-            <a:off x="1600200" y="4976414"/>
-            <a:ext cx="114704" cy="114704"/>
-          </a:xfrm>
-          <a:prstGeom prst="ellipse">
-            <a:avLst/>
-          </a:prstGeom>
-          <a:noFill/>
-          <a:ln>
-            <a:solidFill>
-              <a:schemeClr val="bg1">
-                <a:lumMod val="85000"/>
-              </a:schemeClr>
-            </a:solidFill>
-          </a:ln>
-        </p:spPr>
-        <p:style>
-          <a:lnRef idx="2">
-            <a:schemeClr val="accent1">
-              <a:shade val="50000"/>
-            </a:schemeClr>
-          </a:lnRef>
-          <a:fillRef idx="1">
-            <a:schemeClr val="accent1"/>
-          </a:fillRef>
-          <a:effectRef idx="0">
-            <a:schemeClr val="accent1"/>
-          </a:effectRef>
-          <a:fontRef idx="minor">
-            <a:schemeClr val="lt1"/>
-          </a:fontRef>
-        </p:style>
-        <p:txBody>
-          <a:bodyPr rtlCol="0" anchor="ctr"/>
-          <a:lstStyle/>
-          <a:p>
-            <a:pPr algn="ctr"/>
-            <a:endParaRPr lang="en-US"/>
-          </a:p>
-        </p:txBody>
-      </p:sp>
       <p:cxnSp>
         <p:nvCxnSpPr>
-          <p:cNvPr id="26" name="Straight Arrow Connector 25"/>
+          <p:cNvPr id="49" name="Straight Connector 48"/>
           <p:cNvCxnSpPr/>
           <p:nvPr/>
         </p:nvCxnSpPr>
         <p:spPr>
-          <a:xfrm flipV="1">
-            <a:off x="1257300" y="5091118"/>
-            <a:ext cx="390727" cy="623882"/>
-          </a:xfrm>
-          <a:prstGeom prst="straightConnector1">
+          <a:xfrm flipH="1" flipV="1">
+            <a:off x="1257299" y="4484888"/>
+            <a:ext cx="1" cy="201412"/>
+          </a:xfrm>
+          <a:prstGeom prst="line">
             <a:avLst/>
           </a:prstGeom>
           <a:ln w="38100">
             <a:solidFill>
-              <a:schemeClr val="bg1">
-                <a:lumMod val="85000"/>
-              </a:schemeClr>
+              <a:schemeClr val="tx1"/>
             </a:solidFill>
-            <a:tailEnd type="arrow"/>
+            <a:headEnd type="none" w="med" len="med"/>
+            <a:tailEnd type="none" w="med" len="med"/>
           </a:ln>
         </p:spPr>
         <p:style>
@@ -4675,14 +7491,14 @@
       </p:cxnSp>
       <p:sp>
         <p:nvSpPr>
-          <p:cNvPr id="28" name="TextBox 27"/>
+          <p:cNvPr id="1039" name="TextBox 1038"/>
           <p:cNvSpPr txBox="1"/>
           <p:nvPr/>
         </p:nvSpPr>
         <p:spPr>
           <a:xfrm>
-            <a:off x="630794" y="5600700"/>
-            <a:ext cx="937116" cy="923330"/>
+            <a:off x="5372100" y="114300"/>
+            <a:ext cx="1801327" cy="369332"/>
           </a:xfrm>
           <a:prstGeom prst="rect">
             <a:avLst/>
@@ -4697,201 +7513,34 @@
           <a:p>
             <a:r>
               <a:rPr lang="en-US" dirty="0" smtClean="0"/>
-              <a:t>Analog</a:t>
-            </a:r>
-          </a:p>
-          <a:p>
-            <a:r>
-              <a:rPr lang="en-US" dirty="0" smtClean="0"/>
-              <a:t>Weight</a:t>
-            </a:r>
-          </a:p>
-          <a:p>
-            <a:r>
-              <a:rPr lang="en-US" dirty="0" smtClean="0"/>
-              <a:t>Reading</a:t>
+              <a:t>ESP8266 D1 Mini</a:t>
             </a:r>
             <a:endParaRPr lang="en-US" dirty="0"/>
-          </a:p>
-        </p:txBody>
-      </p:sp>
-      <p:sp>
-        <p:nvSpPr>
-          <p:cNvPr id="29" name="TextBox 28"/>
-          <p:cNvSpPr txBox="1"/>
-          <p:nvPr/>
-        </p:nvSpPr>
-        <p:spPr>
-          <a:xfrm>
-            <a:off x="1831146" y="5588000"/>
-            <a:ext cx="1221873" cy="646331"/>
-          </a:xfrm>
-          <a:prstGeom prst="rect">
-            <a:avLst/>
-          </a:prstGeom>
-          <a:noFill/>
-        </p:spPr>
-        <p:txBody>
-          <a:bodyPr wrap="none" rtlCol="0">
-            <a:spAutoFit/>
-          </a:bodyPr>
-          <a:lstStyle/>
-          <a:p>
-            <a:r>
-              <a:rPr lang="en-US" dirty="0" smtClean="0"/>
-              <a:t>3.3v</a:t>
-            </a:r>
-          </a:p>
-          <a:p>
-            <a:r>
-              <a:rPr lang="en-US" dirty="0" smtClean="0"/>
-              <a:t>(regulated)</a:t>
-            </a:r>
-            <a:endParaRPr lang="en-US" dirty="0"/>
-          </a:p>
-        </p:txBody>
-      </p:sp>
-      <p:sp>
-        <p:nvSpPr>
-          <p:cNvPr id="30" name="TextBox 29"/>
-          <p:cNvSpPr txBox="1"/>
-          <p:nvPr/>
-        </p:nvSpPr>
-        <p:spPr>
-          <a:xfrm>
-            <a:off x="3031498" y="5600700"/>
-            <a:ext cx="894156" cy="369332"/>
-          </a:xfrm>
-          <a:prstGeom prst="rect">
-            <a:avLst/>
-          </a:prstGeom>
-          <a:noFill/>
-        </p:spPr>
-        <p:txBody>
-          <a:bodyPr wrap="none" rtlCol="0">
-            <a:spAutoFit/>
-          </a:bodyPr>
-          <a:lstStyle/>
-          <a:p>
-            <a:r>
-              <a:rPr lang="en-US" dirty="0" smtClean="0"/>
-              <a:t>Ground</a:t>
-            </a:r>
-            <a:endParaRPr lang="en-US" dirty="0"/>
-          </a:p>
-        </p:txBody>
-      </p:sp>
-      <p:sp>
-        <p:nvSpPr>
-          <p:cNvPr id="31" name="Oval 30"/>
-          <p:cNvSpPr/>
-          <p:nvPr/>
-        </p:nvSpPr>
-        <p:spPr>
-          <a:xfrm>
-            <a:off x="2735652" y="3657600"/>
-            <a:ext cx="114704" cy="114704"/>
-          </a:xfrm>
-          <a:prstGeom prst="ellipse">
-            <a:avLst/>
-          </a:prstGeom>
-          <a:noFill/>
-          <a:ln>
-            <a:solidFill>
-              <a:schemeClr val="tx1"/>
-            </a:solidFill>
-          </a:ln>
-        </p:spPr>
-        <p:style>
-          <a:lnRef idx="2">
-            <a:schemeClr val="accent1">
-              <a:shade val="50000"/>
-            </a:schemeClr>
-          </a:lnRef>
-          <a:fillRef idx="1">
-            <a:schemeClr val="accent1"/>
-          </a:fillRef>
-          <a:effectRef idx="0">
-            <a:schemeClr val="accent1"/>
-          </a:effectRef>
-          <a:fontRef idx="minor">
-            <a:schemeClr val="lt1"/>
-          </a:fontRef>
-        </p:style>
-        <p:txBody>
-          <a:bodyPr rtlCol="0" anchor="ctr"/>
-          <a:lstStyle/>
-          <a:p>
-            <a:pPr algn="ctr"/>
-            <a:endParaRPr lang="en-US"/>
-          </a:p>
-        </p:txBody>
-      </p:sp>
-      <p:sp>
-        <p:nvSpPr>
-          <p:cNvPr id="32" name="Oval 31"/>
-          <p:cNvSpPr/>
-          <p:nvPr/>
-        </p:nvSpPr>
-        <p:spPr>
-          <a:xfrm>
-            <a:off x="2730494" y="4298151"/>
-            <a:ext cx="114704" cy="114704"/>
-          </a:xfrm>
-          <a:prstGeom prst="ellipse">
-            <a:avLst/>
-          </a:prstGeom>
-          <a:noFill/>
-          <a:ln>
-            <a:solidFill>
-              <a:srgbClr val="FF0000"/>
-            </a:solidFill>
-          </a:ln>
-        </p:spPr>
-        <p:style>
-          <a:lnRef idx="2">
-            <a:schemeClr val="accent1">
-              <a:shade val="50000"/>
-            </a:schemeClr>
-          </a:lnRef>
-          <a:fillRef idx="1">
-            <a:schemeClr val="accent1"/>
-          </a:fillRef>
-          <a:effectRef idx="0">
-            <a:schemeClr val="accent1"/>
-          </a:effectRef>
-          <a:fontRef idx="minor">
-            <a:schemeClr val="lt1"/>
-          </a:fontRef>
-        </p:style>
-        <p:txBody>
-          <a:bodyPr rtlCol="0" anchor="ctr"/>
-          <a:lstStyle/>
-          <a:p>
-            <a:pPr algn="ctr"/>
-            <a:endParaRPr lang="en-US"/>
           </a:p>
         </p:txBody>
       </p:sp>
       <p:cxnSp>
         <p:nvCxnSpPr>
-          <p:cNvPr id="17" name="Straight Arrow Connector 16"/>
+          <p:cNvPr id="54" name="Straight Connector 53"/>
           <p:cNvCxnSpPr/>
           <p:nvPr/>
         </p:nvCxnSpPr>
         <p:spPr>
-          <a:xfrm flipH="1" flipV="1">
-            <a:off x="3943350" y="3705226"/>
-            <a:ext cx="514350" cy="2009774"/>
-          </a:xfrm>
-          <a:prstGeom prst="straightConnector1">
+          <a:xfrm flipH="1">
+            <a:off x="228600" y="1406768"/>
+            <a:ext cx="1565032" cy="0"/>
+          </a:xfrm>
+          <a:prstGeom prst="line">
             <a:avLst/>
           </a:prstGeom>
           <a:ln w="38100">
             <a:solidFill>
-              <a:srgbClr val="00B0F0"/>
+              <a:schemeClr val="accent6">
+                <a:lumMod val="75000"/>
+              </a:schemeClr>
             </a:solidFill>
-            <a:tailEnd type="arrow"/>
+            <a:headEnd type="none" w="med" len="med"/>
+            <a:tailEnd type="none" w="med" len="med"/>
           </a:ln>
         </p:spPr>
         <p:style>
@@ -4909,62 +7558,28 @@
           </a:fontRef>
         </p:style>
       </p:cxnSp>
-      <p:sp>
-        <p:nvSpPr>
-          <p:cNvPr id="18" name="TextBox 17"/>
-          <p:cNvSpPr txBox="1"/>
-          <p:nvPr/>
-        </p:nvSpPr>
-        <p:spPr>
-          <a:xfrm>
-            <a:off x="4229100" y="5600700"/>
-            <a:ext cx="1644233" cy="646331"/>
-          </a:xfrm>
-          <a:prstGeom prst="rect">
-            <a:avLst/>
-          </a:prstGeom>
-          <a:noFill/>
-        </p:spPr>
-        <p:txBody>
-          <a:bodyPr wrap="none" rtlCol="0">
-            <a:spAutoFit/>
-          </a:bodyPr>
-          <a:lstStyle/>
-          <a:p>
-            <a:r>
-              <a:rPr lang="en-US" dirty="0" err="1" smtClean="0"/>
-              <a:t>Desolder</a:t>
-            </a:r>
-            <a:endParaRPr lang="en-US" dirty="0"/>
-          </a:p>
-          <a:p>
-            <a:r>
-              <a:rPr lang="en-US" dirty="0" smtClean="0"/>
-              <a:t>Microcontroller</a:t>
-            </a:r>
-            <a:endParaRPr lang="en-US" dirty="0"/>
-          </a:p>
-        </p:txBody>
-      </p:sp>
       <p:cxnSp>
         <p:nvCxnSpPr>
-          <p:cNvPr id="21" name="Straight Arrow Connector 20"/>
+          <p:cNvPr id="56" name="Straight Connector 55"/>
           <p:cNvCxnSpPr/>
           <p:nvPr/>
         </p:nvCxnSpPr>
         <p:spPr>
-          <a:xfrm flipH="1" flipV="1">
-            <a:off x="5886450" y="3086100"/>
-            <a:ext cx="228600" cy="2668369"/>
-          </a:xfrm>
-          <a:prstGeom prst="straightConnector1">
+          <a:xfrm flipH="1">
+            <a:off x="228600" y="2101364"/>
+            <a:ext cx="1485900" cy="0"/>
+          </a:xfrm>
+          <a:prstGeom prst="line">
             <a:avLst/>
           </a:prstGeom>
           <a:ln w="38100">
             <a:solidFill>
-              <a:srgbClr val="00B0F0"/>
+              <a:schemeClr val="accent6">
+                <a:lumMod val="75000"/>
+              </a:schemeClr>
             </a:solidFill>
-            <a:tailEnd type="arrow"/>
+            <a:headEnd type="none" w="med" len="med"/>
+            <a:tailEnd type="none" w="med" len="med"/>
           </a:ln>
         </p:spPr>
         <p:style>
@@ -4982,53 +7597,62 @@
           </a:fontRef>
         </p:style>
       </p:cxnSp>
-      <p:sp>
-        <p:nvSpPr>
-          <p:cNvPr id="22" name="TextBox 21"/>
-          <p:cNvSpPr txBox="1"/>
-          <p:nvPr/>
-        </p:nvSpPr>
-        <p:spPr>
-          <a:xfrm>
-            <a:off x="5886450" y="5640169"/>
-            <a:ext cx="1724575" cy="646331"/>
-          </a:xfrm>
-          <a:prstGeom prst="rect">
-            <a:avLst/>
-          </a:prstGeom>
-          <a:noFill/>
-        </p:spPr>
-        <p:txBody>
-          <a:bodyPr wrap="none" rtlCol="0">
-            <a:spAutoFit/>
-          </a:bodyPr>
-          <a:lstStyle/>
-          <a:p>
-            <a:r>
-              <a:rPr lang="en-US" dirty="0" err="1" smtClean="0"/>
-              <a:t>Desolder</a:t>
-            </a:r>
-            <a:endParaRPr lang="en-US" dirty="0"/>
-          </a:p>
-          <a:p>
-            <a:r>
-              <a:rPr lang="en-US" dirty="0" smtClean="0"/>
-              <a:t>Bluetooth Board</a:t>
-            </a:r>
-            <a:endParaRPr lang="en-US" dirty="0"/>
-          </a:p>
-        </p:txBody>
-      </p:sp>
+      <p:cxnSp>
+        <p:nvCxnSpPr>
+          <p:cNvPr id="58" name="Straight Connector 57"/>
+          <p:cNvCxnSpPr/>
+          <p:nvPr/>
+        </p:nvCxnSpPr>
+        <p:spPr>
+          <a:xfrm flipV="1">
+            <a:off x="228600" y="1409144"/>
+            <a:ext cx="0" cy="692220"/>
+          </a:xfrm>
+          <a:prstGeom prst="line">
+            <a:avLst/>
+          </a:prstGeom>
+          <a:ln w="38100">
+            <a:solidFill>
+              <a:schemeClr val="accent6">
+                <a:lumMod val="75000"/>
+              </a:schemeClr>
+            </a:solidFill>
+            <a:headEnd type="none" w="med" len="med"/>
+            <a:tailEnd type="none" w="med" len="med"/>
+          </a:ln>
+        </p:spPr>
+        <p:style>
+          <a:lnRef idx="1">
+            <a:schemeClr val="accent1"/>
+          </a:lnRef>
+          <a:fillRef idx="0">
+            <a:schemeClr val="accent1"/>
+          </a:fillRef>
+          <a:effectRef idx="0">
+            <a:schemeClr val="accent1"/>
+          </a:effectRef>
+          <a:fontRef idx="minor">
+            <a:schemeClr val="tx1"/>
+          </a:fontRef>
+        </p:style>
+      </p:cxnSp>
     </p:spTree>
     <p:extLst>
       <p:ext uri="{BB962C8B-B14F-4D97-AF65-F5344CB8AC3E}">
-        <p14:creationId xmlns:p14="http://schemas.microsoft.com/office/powerpoint/2010/main" val="667297604"/>
+        <p14:creationId xmlns:p14="http://schemas.microsoft.com/office/powerpoint/2010/main" val="151271620"/>
       </p:ext>
     </p:extLst>
   </p:cSld>
   <p:clrMapOvr>
     <a:masterClrMapping/>
   </p:clrMapOvr>
+  <p:timing>
+    <p:tnLst>
+      <p:par>
+        <p:cTn id="1" dur="indefinite" restart="never" nodeType="tmRoot"/>
+      </p:par>
+    </p:tnLst>
+  </p:timing>
 </p:sld>
 </file>
 

</xml_diff>